<commit_message>
Finished presentation with my part
</commit_message>
<xml_diff>
--- a/doc/prezi.pptx
+++ b/doc/prezi.pptx
@@ -5,13 +5,16 @@
     <p:sldMasterId id="2147483756" r:id="rId1"/>
   </p:sldMasterIdLst>
   <p:notesMasterIdLst>
-    <p:notesMasterId r:id="rId6"/>
+    <p:notesMasterId r:id="rId9"/>
   </p:notesMasterIdLst>
   <p:sldIdLst>
     <p:sldId id="256" r:id="rId2"/>
     <p:sldId id="257" r:id="rId3"/>
     <p:sldId id="258" r:id="rId4"/>
     <p:sldId id="259" r:id="rId5"/>
+    <p:sldId id="261" r:id="rId6"/>
+    <p:sldId id="263" r:id="rId7"/>
+    <p:sldId id="264" r:id="rId8"/>
   </p:sldIdLst>
   <p:sldSz cx="9144000" cy="6858000" type="screen4x3"/>
   <p:notesSz cx="6858000" cy="9144000"/>
@@ -110,6 +113,22 @@
       </a:defRPr>
     </a:lvl9pPr>
   </p:defaultTextStyle>
+  <p:extLst>
+    <p:ext uri="{EFAFB233-063F-42B5-8137-9DF3F51BA10A}">
+      <p15:sldGuideLst xmlns:p15="http://schemas.microsoft.com/office/powerpoint/2012/main">
+        <p15:guide id="1" orient="horz" pos="2160">
+          <p15:clr>
+            <a:srgbClr val="A4A3A4"/>
+          </p15:clr>
+        </p15:guide>
+        <p15:guide id="2" pos="2880">
+          <p15:clr>
+            <a:srgbClr val="A4A3A4"/>
+          </p15:clr>
+        </p15:guide>
+      </p15:sldGuideLst>
+    </p:ext>
+  </p:extLst>
 </p:presentation>
 </file>
 
@@ -195,7 +214,7 @@
           <a:p>
             <a:fld id="{2F78405D-B9E0-4C92-A575-D79B7FC418FE}" type="datetimeFigureOut">
               <a:rPr lang="hu-HU" smtClean="0"/>
-              <a:t>2015. 12. 02.</a:t>
+              <a:t>2015.12.04.</a:t>
             </a:fld>
             <a:endParaRPr lang="hu-HU"/>
           </a:p>
@@ -930,6 +949,48 @@
           <a:bodyPr/>
           <a:lstStyle/>
           <a:p>
+            <a:r>
+              <a:rPr lang="en-US" dirty="0" smtClean="0"/>
+              <a:t>MODULOK!</a:t>
+            </a:r>
+          </a:p>
+          <a:p>
+            <a:r>
+              <a:rPr lang="en-US" dirty="0" err="1" smtClean="0"/>
+              <a:t>Modulok</a:t>
+            </a:r>
+            <a:r>
+              <a:rPr lang="en-US" baseline="0" dirty="0" smtClean="0"/>
+              <a:t> </a:t>
+            </a:r>
+            <a:r>
+              <a:rPr lang="en-US" baseline="0" dirty="0" err="1" smtClean="0"/>
+              <a:t>kezelését</a:t>
+            </a:r>
+            <a:r>
+              <a:rPr lang="en-US" baseline="0" dirty="0" smtClean="0"/>
+              <a:t> </a:t>
+            </a:r>
+            <a:r>
+              <a:rPr lang="en-US" baseline="0" dirty="0" err="1" smtClean="0"/>
+              <a:t>tovább</a:t>
+            </a:r>
+            <a:r>
+              <a:rPr lang="en-US" baseline="0" dirty="0" smtClean="0"/>
+              <a:t> </a:t>
+            </a:r>
+            <a:r>
+              <a:rPr lang="en-US" baseline="0" dirty="0" err="1" smtClean="0"/>
+              <a:t>lehetne</a:t>
+            </a:r>
+            <a:r>
+              <a:rPr lang="en-US" baseline="0" dirty="0" smtClean="0"/>
+              <a:t> </a:t>
+            </a:r>
+            <a:r>
+              <a:rPr lang="en-US" baseline="0" dirty="0" err="1" smtClean="0"/>
+              <a:t>vinni</a:t>
+            </a:r>
             <a:endParaRPr lang="hu-HU" dirty="0"/>
           </a:p>
         </p:txBody>
@@ -961,6 +1022,475 @@
     <p:extLst>
       <p:ext uri="{BB962C8B-B14F-4D97-AF65-F5344CB8AC3E}">
         <p14:creationId xmlns:p14="http://schemas.microsoft.com/office/powerpoint/2010/main" val="1096121422"/>
+      </p:ext>
+    </p:extLst>
+  </p:cSld>
+  <p:clrMapOvr>
+    <a:masterClrMapping/>
+  </p:clrMapOvr>
+</p:notes>
+</file>
+
+<file path=ppt/notesSlides/notesSlide4.xml><?xml version="1.0" encoding="utf-8"?>
+<p:notes xmlns:a="http://schemas.openxmlformats.org/drawingml/2006/main" xmlns:r="http://schemas.openxmlformats.org/officeDocument/2006/relationships" xmlns:p="http://schemas.openxmlformats.org/presentationml/2006/main">
+  <p:cSld>
+    <p:spTree>
+      <p:nvGrpSpPr>
+        <p:cNvPr id="1" name=""/>
+        <p:cNvGrpSpPr/>
+        <p:nvPr/>
+      </p:nvGrpSpPr>
+      <p:grpSpPr>
+        <a:xfrm>
+          <a:off x="0" y="0"/>
+          <a:ext cx="0" cy="0"/>
+          <a:chOff x="0" y="0"/>
+          <a:chExt cx="0" cy="0"/>
+        </a:xfrm>
+      </p:grpSpPr>
+      <p:sp>
+        <p:nvSpPr>
+          <p:cNvPr id="2" name="Diakép helye 1"/>
+          <p:cNvSpPr>
+            <a:spLocks noGrp="1" noRot="1" noChangeAspect="1"/>
+          </p:cNvSpPr>
+          <p:nvPr>
+            <p:ph type="sldImg"/>
+          </p:nvPr>
+        </p:nvSpPr>
+        <p:spPr/>
+      </p:sp>
+      <p:sp>
+        <p:nvSpPr>
+          <p:cNvPr id="3" name="Jegyzetek helye 2"/>
+          <p:cNvSpPr>
+            <a:spLocks noGrp="1"/>
+          </p:cNvSpPr>
+          <p:nvPr>
+            <p:ph type="body" idx="1"/>
+          </p:nvPr>
+        </p:nvSpPr>
+        <p:spPr/>
+        <p:txBody>
+          <a:bodyPr/>
+          <a:lstStyle/>
+          <a:p>
+            <a:r>
+              <a:rPr lang="en-US" dirty="0" err="1" smtClean="0"/>
+              <a:t>Megjelenítése</a:t>
+            </a:r>
+            <a:r>
+              <a:rPr lang="en-US" dirty="0" smtClean="0"/>
+              <a:t> </a:t>
+            </a:r>
+            <a:r>
+              <a:rPr lang="en-US" dirty="0" err="1" smtClean="0"/>
+              <a:t>az</a:t>
+            </a:r>
+            <a:r>
+              <a:rPr lang="en-US" dirty="0" smtClean="0"/>
+              <a:t> </a:t>
+            </a:r>
+            <a:r>
+              <a:rPr lang="en-US" dirty="0" err="1" smtClean="0"/>
+              <a:t>adatbázisnak</a:t>
+            </a:r>
+            <a:r>
+              <a:rPr lang="en-US" dirty="0" smtClean="0"/>
+              <a:t> </a:t>
+            </a:r>
+            <a:r>
+              <a:rPr lang="en-US" dirty="0" err="1" smtClean="0"/>
+              <a:t>olvashatóbb</a:t>
+            </a:r>
+            <a:r>
+              <a:rPr lang="en-US" dirty="0" smtClean="0"/>
+              <a:t> </a:t>
+            </a:r>
+            <a:r>
+              <a:rPr lang="en-US" dirty="0" err="1" smtClean="0"/>
+              <a:t>formában</a:t>
+            </a:r>
+            <a:endParaRPr lang="en-US" dirty="0" smtClean="0"/>
+          </a:p>
+          <a:p>
+            <a:r>
+              <a:rPr lang="en-US" dirty="0" smtClean="0"/>
+              <a:t>Minden</a:t>
+            </a:r>
+            <a:r>
+              <a:rPr lang="en-US" baseline="0" dirty="0" smtClean="0"/>
+              <a:t> </a:t>
+            </a:r>
+            <a:r>
+              <a:rPr lang="en-US" baseline="0" dirty="0" err="1" smtClean="0"/>
+              <a:t>modulra</a:t>
+            </a:r>
+            <a:r>
+              <a:rPr lang="en-US" baseline="0" dirty="0" smtClean="0"/>
+              <a:t> </a:t>
+            </a:r>
+            <a:r>
+              <a:rPr lang="en-US" baseline="0" dirty="0" err="1" smtClean="0"/>
+              <a:t>történő</a:t>
+            </a:r>
+            <a:r>
+              <a:rPr lang="en-US" baseline="0" dirty="0" smtClean="0"/>
+              <a:t> </a:t>
+            </a:r>
+            <a:r>
+              <a:rPr lang="en-US" baseline="0" dirty="0" err="1" smtClean="0"/>
+              <a:t>belépéskor</a:t>
+            </a:r>
+            <a:r>
+              <a:rPr lang="en-US" baseline="0" dirty="0" smtClean="0"/>
+              <a:t> </a:t>
+            </a:r>
+            <a:r>
+              <a:rPr lang="en-US" baseline="0" dirty="0" err="1" smtClean="0"/>
+              <a:t>és</a:t>
+            </a:r>
+            <a:r>
+              <a:rPr lang="en-US" baseline="0" dirty="0" smtClean="0"/>
+              <a:t> </a:t>
+            </a:r>
+            <a:r>
+              <a:rPr lang="en-US" baseline="0" dirty="0" err="1" smtClean="0"/>
+              <a:t>minden</a:t>
+            </a:r>
+            <a:r>
+              <a:rPr lang="en-US" baseline="0" dirty="0" smtClean="0"/>
+              <a:t> </a:t>
+            </a:r>
+            <a:r>
+              <a:rPr lang="en-US" baseline="0" dirty="0" err="1" smtClean="0"/>
+              <a:t>adatbázissal</a:t>
+            </a:r>
+            <a:r>
+              <a:rPr lang="en-US" baseline="0" dirty="0" smtClean="0"/>
+              <a:t> </a:t>
+            </a:r>
+            <a:r>
+              <a:rPr lang="en-US" baseline="0" dirty="0" err="1" smtClean="0"/>
+              <a:t>kapcsolatos</a:t>
+            </a:r>
+            <a:r>
+              <a:rPr lang="en-US" baseline="0" dirty="0" smtClean="0"/>
+              <a:t> </a:t>
+            </a:r>
+            <a:r>
+              <a:rPr lang="en-US" baseline="0" dirty="0" err="1" smtClean="0"/>
+              <a:t>művelet</a:t>
+            </a:r>
+            <a:r>
+              <a:rPr lang="en-US" baseline="0" dirty="0" smtClean="0"/>
+              <a:t> </a:t>
+            </a:r>
+            <a:r>
+              <a:rPr lang="en-US" baseline="0" dirty="0" err="1" smtClean="0"/>
+              <a:t>esetén</a:t>
+            </a:r>
+            <a:r>
+              <a:rPr lang="en-US" baseline="0" dirty="0" smtClean="0"/>
+              <a:t> (</a:t>
+            </a:r>
+            <a:r>
+              <a:rPr lang="en-US" baseline="0" dirty="0" err="1" smtClean="0"/>
+              <a:t>lekérdezés</a:t>
+            </a:r>
+            <a:r>
+              <a:rPr lang="en-US" baseline="0" dirty="0" smtClean="0"/>
+              <a:t>, </a:t>
+            </a:r>
+            <a:r>
+              <a:rPr lang="en-US" baseline="0" dirty="0" err="1" smtClean="0"/>
+              <a:t>módosítás</a:t>
+            </a:r>
+            <a:r>
+              <a:rPr lang="en-US" baseline="0" dirty="0" smtClean="0"/>
+              <a:t>) </a:t>
+            </a:r>
+            <a:r>
+              <a:rPr lang="en-US" baseline="0" dirty="0" err="1" smtClean="0"/>
+              <a:t>autentikáció</a:t>
+            </a:r>
+            <a:endParaRPr lang="en-US" dirty="0" smtClean="0"/>
+          </a:p>
+          <a:p>
+            <a:r>
+              <a:rPr lang="en-US" dirty="0" err="1" smtClean="0"/>
+              <a:t>Bevitelek</a:t>
+            </a:r>
+            <a:r>
+              <a:rPr lang="en-US" dirty="0" smtClean="0"/>
+              <a:t>, </a:t>
+            </a:r>
+            <a:r>
+              <a:rPr lang="en-US" dirty="0" err="1" smtClean="0"/>
+              <a:t>módosítások</a:t>
+            </a:r>
+            <a:r>
+              <a:rPr lang="en-US" dirty="0" smtClean="0"/>
+              <a:t> </a:t>
+            </a:r>
+            <a:r>
+              <a:rPr lang="en-US" dirty="0" err="1" smtClean="0"/>
+              <a:t>formokkal</a:t>
+            </a:r>
+            <a:r>
+              <a:rPr lang="en-US" dirty="0" smtClean="0"/>
+              <a:t> </a:t>
+            </a:r>
+            <a:r>
+              <a:rPr lang="en-US" dirty="0" err="1" smtClean="0"/>
+              <a:t>történnek</a:t>
+            </a:r>
+            <a:endParaRPr lang="hu-HU" dirty="0"/>
+          </a:p>
+        </p:txBody>
+      </p:sp>
+      <p:sp>
+        <p:nvSpPr>
+          <p:cNvPr id="4" name="Dia számának helye 3"/>
+          <p:cNvSpPr>
+            <a:spLocks noGrp="1"/>
+          </p:cNvSpPr>
+          <p:nvPr>
+            <p:ph type="sldNum" sz="quarter" idx="10"/>
+          </p:nvPr>
+        </p:nvSpPr>
+        <p:spPr/>
+        <p:txBody>
+          <a:bodyPr/>
+          <a:lstStyle/>
+          <a:p>
+            <a:fld id="{89621FD5-E5D4-4EF3-8632-1FA8EE767FCD}" type="slidenum">
+              <a:rPr lang="hu-HU" smtClean="0"/>
+              <a:t>5</a:t>
+            </a:fld>
+            <a:endParaRPr lang="hu-HU"/>
+          </a:p>
+        </p:txBody>
+      </p:sp>
+    </p:spTree>
+    <p:extLst>
+      <p:ext uri="{BB962C8B-B14F-4D97-AF65-F5344CB8AC3E}">
+        <p14:creationId xmlns:p14="http://schemas.microsoft.com/office/powerpoint/2010/main" val="3332358672"/>
+      </p:ext>
+    </p:extLst>
+  </p:cSld>
+  <p:clrMapOvr>
+    <a:masterClrMapping/>
+  </p:clrMapOvr>
+</p:notes>
+</file>
+
+<file path=ppt/notesSlides/notesSlide5.xml><?xml version="1.0" encoding="utf-8"?>
+<p:notes xmlns:a="http://schemas.openxmlformats.org/drawingml/2006/main" xmlns:r="http://schemas.openxmlformats.org/officeDocument/2006/relationships" xmlns:p="http://schemas.openxmlformats.org/presentationml/2006/main">
+  <p:cSld>
+    <p:spTree>
+      <p:nvGrpSpPr>
+        <p:cNvPr id="1" name=""/>
+        <p:cNvGrpSpPr/>
+        <p:nvPr/>
+      </p:nvGrpSpPr>
+      <p:grpSpPr>
+        <a:xfrm>
+          <a:off x="0" y="0"/>
+          <a:ext cx="0" cy="0"/>
+          <a:chOff x="0" y="0"/>
+          <a:chExt cx="0" cy="0"/>
+        </a:xfrm>
+      </p:grpSpPr>
+      <p:sp>
+        <p:nvSpPr>
+          <p:cNvPr id="2" name="Diakép helye 1"/>
+          <p:cNvSpPr>
+            <a:spLocks noGrp="1" noRot="1" noChangeAspect="1"/>
+          </p:cNvSpPr>
+          <p:nvPr>
+            <p:ph type="sldImg"/>
+          </p:nvPr>
+        </p:nvSpPr>
+        <p:spPr/>
+      </p:sp>
+      <p:sp>
+        <p:nvSpPr>
+          <p:cNvPr id="3" name="Jegyzetek helye 2"/>
+          <p:cNvSpPr>
+            <a:spLocks noGrp="1"/>
+          </p:cNvSpPr>
+          <p:nvPr>
+            <p:ph type="body" idx="1"/>
+          </p:nvPr>
+        </p:nvSpPr>
+        <p:spPr/>
+        <p:txBody>
+          <a:bodyPr/>
+          <a:lstStyle/>
+          <a:p>
+            <a:r>
+              <a:rPr lang="en-US" dirty="0" smtClean="0"/>
+              <a:t>Minden</a:t>
+            </a:r>
+            <a:r>
+              <a:rPr lang="en-US" baseline="0" dirty="0" smtClean="0"/>
+              <a:t> </a:t>
+            </a:r>
+            <a:r>
+              <a:rPr lang="en-US" baseline="0" dirty="0" err="1" smtClean="0"/>
+              <a:t>modulra</a:t>
+            </a:r>
+            <a:r>
+              <a:rPr lang="en-US" baseline="0" dirty="0" smtClean="0"/>
+              <a:t> </a:t>
+            </a:r>
+            <a:r>
+              <a:rPr lang="en-US" baseline="0" dirty="0" err="1" smtClean="0"/>
+              <a:t>történő</a:t>
+            </a:r>
+            <a:r>
+              <a:rPr lang="en-US" baseline="0" dirty="0" smtClean="0"/>
+              <a:t> </a:t>
+            </a:r>
+            <a:r>
+              <a:rPr lang="en-US" baseline="0" dirty="0" err="1" smtClean="0"/>
+              <a:t>belépéskor</a:t>
+            </a:r>
+            <a:r>
+              <a:rPr lang="en-US" baseline="0" dirty="0" smtClean="0"/>
+              <a:t> </a:t>
+            </a:r>
+            <a:r>
+              <a:rPr lang="en-US" baseline="0" dirty="0" err="1" smtClean="0"/>
+              <a:t>és</a:t>
+            </a:r>
+            <a:r>
+              <a:rPr lang="en-US" baseline="0" dirty="0" smtClean="0"/>
+              <a:t> </a:t>
+            </a:r>
+            <a:r>
+              <a:rPr lang="en-US" baseline="0" dirty="0" err="1" smtClean="0"/>
+              <a:t>minden</a:t>
+            </a:r>
+            <a:r>
+              <a:rPr lang="en-US" baseline="0" dirty="0" smtClean="0"/>
+              <a:t> </a:t>
+            </a:r>
+            <a:r>
+              <a:rPr lang="en-US" baseline="0" dirty="0" err="1" smtClean="0"/>
+              <a:t>adatbázissal</a:t>
+            </a:r>
+            <a:r>
+              <a:rPr lang="en-US" baseline="0" dirty="0" smtClean="0"/>
+              <a:t> </a:t>
+            </a:r>
+            <a:r>
+              <a:rPr lang="en-US" baseline="0" dirty="0" err="1" smtClean="0"/>
+              <a:t>kapcsolatos</a:t>
+            </a:r>
+            <a:r>
+              <a:rPr lang="en-US" baseline="0" dirty="0" smtClean="0"/>
+              <a:t> </a:t>
+            </a:r>
+            <a:r>
+              <a:rPr lang="en-US" baseline="0" dirty="0" err="1" smtClean="0"/>
+              <a:t>művelet</a:t>
+            </a:r>
+            <a:r>
+              <a:rPr lang="en-US" baseline="0" dirty="0" smtClean="0"/>
+              <a:t> </a:t>
+            </a:r>
+            <a:r>
+              <a:rPr lang="en-US" baseline="0" dirty="0" err="1" smtClean="0"/>
+              <a:t>esetén</a:t>
+            </a:r>
+            <a:r>
+              <a:rPr lang="en-US" baseline="0" dirty="0" smtClean="0"/>
+              <a:t> (</a:t>
+            </a:r>
+            <a:r>
+              <a:rPr lang="en-US" baseline="0" dirty="0" err="1" smtClean="0"/>
+              <a:t>lekérdezés</a:t>
+            </a:r>
+            <a:r>
+              <a:rPr lang="en-US" baseline="0" dirty="0" smtClean="0"/>
+              <a:t>, </a:t>
+            </a:r>
+            <a:r>
+              <a:rPr lang="en-US" baseline="0" dirty="0" err="1" smtClean="0"/>
+              <a:t>módosítás</a:t>
+            </a:r>
+            <a:r>
+              <a:rPr lang="en-US" baseline="0" dirty="0" smtClean="0"/>
+              <a:t>) </a:t>
+            </a:r>
+            <a:r>
+              <a:rPr lang="en-US" baseline="0" dirty="0" err="1" smtClean="0"/>
+              <a:t>autentikáció</a:t>
+            </a:r>
+            <a:endParaRPr lang="en-US" dirty="0" smtClean="0"/>
+          </a:p>
+          <a:p>
+            <a:r>
+              <a:rPr lang="en-US" dirty="0" err="1" smtClean="0"/>
+              <a:t>Bevitelek</a:t>
+            </a:r>
+            <a:r>
+              <a:rPr lang="en-US" dirty="0" smtClean="0"/>
+              <a:t>, </a:t>
+            </a:r>
+            <a:r>
+              <a:rPr lang="en-US" dirty="0" err="1" smtClean="0"/>
+              <a:t>módosítások</a:t>
+            </a:r>
+            <a:r>
+              <a:rPr lang="en-US" dirty="0" smtClean="0"/>
+              <a:t> </a:t>
+            </a:r>
+            <a:r>
+              <a:rPr lang="en-US" dirty="0" err="1" smtClean="0"/>
+              <a:t>formokkal</a:t>
+            </a:r>
+            <a:r>
+              <a:rPr lang="en-US" dirty="0" smtClean="0"/>
+              <a:t> </a:t>
+            </a:r>
+            <a:r>
+              <a:rPr lang="en-US" dirty="0" err="1" smtClean="0"/>
+              <a:t>történnek</a:t>
+            </a:r>
+            <a:endParaRPr lang="hu-HU" dirty="0"/>
+          </a:p>
+        </p:txBody>
+      </p:sp>
+      <p:sp>
+        <p:nvSpPr>
+          <p:cNvPr id="4" name="Dia számának helye 3"/>
+          <p:cNvSpPr>
+            <a:spLocks noGrp="1"/>
+          </p:cNvSpPr>
+          <p:nvPr>
+            <p:ph type="sldNum" sz="quarter" idx="10"/>
+          </p:nvPr>
+        </p:nvSpPr>
+        <p:spPr/>
+        <p:txBody>
+          <a:bodyPr/>
+          <a:lstStyle/>
+          <a:p>
+            <a:fld id="{89621FD5-E5D4-4EF3-8632-1FA8EE767FCD}" type="slidenum">
+              <a:rPr lang="hu-HU" smtClean="0"/>
+              <a:t>6</a:t>
+            </a:fld>
+            <a:endParaRPr lang="hu-HU"/>
+          </a:p>
+        </p:txBody>
+      </p:sp>
+    </p:spTree>
+    <p:extLst>
+      <p:ext uri="{BB962C8B-B14F-4D97-AF65-F5344CB8AC3E}">
+        <p14:creationId xmlns:p14="http://schemas.microsoft.com/office/powerpoint/2010/main" val="144553892"/>
       </p:ext>
     </p:extLst>
   </p:cSld>
@@ -1438,7 +1968,7 @@
           <a:p>
             <a:fld id="{9DF4919B-4047-4DB1-8B39-23A42AEBA556}" type="datetimeFigureOut">
               <a:rPr lang="hu-HU" smtClean="0"/>
-              <a:t>2015. 12. 02.</a:t>
+              <a:t>2015.12.04.</a:t>
             </a:fld>
             <a:endParaRPr lang="hu-HU"/>
           </a:p>
@@ -1603,7 +2133,7 @@
           <a:p>
             <a:fld id="{9DF4919B-4047-4DB1-8B39-23A42AEBA556}" type="datetimeFigureOut">
               <a:rPr lang="hu-HU" smtClean="0"/>
-              <a:t>2015. 12. 02.</a:t>
+              <a:t>2015.12.04.</a:t>
             </a:fld>
             <a:endParaRPr lang="hu-HU"/>
           </a:p>
@@ -1778,7 +2308,7 @@
           <a:p>
             <a:fld id="{9DF4919B-4047-4DB1-8B39-23A42AEBA556}" type="datetimeFigureOut">
               <a:rPr lang="hu-HU" smtClean="0"/>
-              <a:t>2015. 12. 02.</a:t>
+              <a:t>2015.12.04.</a:t>
             </a:fld>
             <a:endParaRPr lang="hu-HU"/>
           </a:p>
@@ -1943,7 +2473,7 @@
           <a:p>
             <a:fld id="{9DF4919B-4047-4DB1-8B39-23A42AEBA556}" type="datetimeFigureOut">
               <a:rPr lang="hu-HU" smtClean="0"/>
-              <a:t>2015. 12. 02.</a:t>
+              <a:t>2015.12.04.</a:t>
             </a:fld>
             <a:endParaRPr lang="hu-HU"/>
           </a:p>
@@ -2496,7 +3026,7 @@
           <a:p>
             <a:fld id="{9DF4919B-4047-4DB1-8B39-23A42AEBA556}" type="datetimeFigureOut">
               <a:rPr lang="hu-HU" smtClean="0"/>
-              <a:t>2015. 12. 02.</a:t>
+              <a:t>2015.12.04.</a:t>
             </a:fld>
             <a:endParaRPr lang="hu-HU"/>
           </a:p>
@@ -2756,7 +3286,7 @@
           <a:p>
             <a:fld id="{9DF4919B-4047-4DB1-8B39-23A42AEBA556}" type="datetimeFigureOut">
               <a:rPr lang="hu-HU" smtClean="0"/>
-              <a:t>2015. 12. 02.</a:t>
+              <a:t>2015.12.04.</a:t>
             </a:fld>
             <a:endParaRPr lang="hu-HU"/>
           </a:p>
@@ -3244,7 +3774,7 @@
           <a:p>
             <a:fld id="{9DF4919B-4047-4DB1-8B39-23A42AEBA556}" type="datetimeFigureOut">
               <a:rPr lang="hu-HU" smtClean="0"/>
-              <a:t>2015. 12. 02.</a:t>
+              <a:t>2015.12.04.</a:t>
             </a:fld>
             <a:endParaRPr lang="hu-HU"/>
           </a:p>
@@ -3357,7 +3887,7 @@
           <a:p>
             <a:fld id="{9DF4919B-4047-4DB1-8B39-23A42AEBA556}" type="datetimeFigureOut">
               <a:rPr lang="hu-HU" smtClean="0"/>
-              <a:t>2015. 12. 02.</a:t>
+              <a:t>2015.12.04.</a:t>
             </a:fld>
             <a:endParaRPr lang="hu-HU"/>
           </a:p>
@@ -3447,7 +3977,7 @@
           <a:p>
             <a:fld id="{9DF4919B-4047-4DB1-8B39-23A42AEBA556}" type="datetimeFigureOut">
               <a:rPr lang="hu-HU" smtClean="0"/>
-              <a:t>2015. 12. 02.</a:t>
+              <a:t>2015.12.04.</a:t>
             </a:fld>
             <a:endParaRPr lang="hu-HU"/>
           </a:p>
@@ -3877,7 +4407,7 @@
           <a:p>
             <a:fld id="{9DF4919B-4047-4DB1-8B39-23A42AEBA556}" type="datetimeFigureOut">
               <a:rPr lang="hu-HU" smtClean="0"/>
-              <a:t>2015. 12. 02.</a:t>
+              <a:t>2015.12.04.</a:t>
             </a:fld>
             <a:endParaRPr lang="hu-HU"/>
           </a:p>
@@ -4410,7 +4940,7 @@
           <a:p>
             <a:fld id="{9DF4919B-4047-4DB1-8B39-23A42AEBA556}" type="datetimeFigureOut">
               <a:rPr lang="hu-HU" smtClean="0"/>
-              <a:t>2015. 12. 02.</a:t>
+              <a:t>2015.12.04.</a:t>
             </a:fld>
             <a:endParaRPr lang="hu-HU"/>
           </a:p>
@@ -5250,7 +5780,7 @@
           <a:p>
             <a:fld id="{9DF4919B-4047-4DB1-8B39-23A42AEBA556}" type="datetimeFigureOut">
               <a:rPr lang="hu-HU" smtClean="0"/>
-              <a:t>2015. 12. 02.</a:t>
+              <a:t>2015.12.04.</a:t>
             </a:fld>
             <a:endParaRPr lang="hu-HU"/>
           </a:p>
@@ -5806,7 +6336,15 @@
           <a:p>
             <a:r>
               <a:rPr lang="hu-HU" dirty="0" err="1" smtClean="0"/>
-              <a:t>Arhitektúra</a:t>
+              <a:t>Ar</a:t>
+            </a:r>
+            <a:r>
+              <a:rPr lang="en-US" dirty="0" smtClean="0"/>
+              <a:t>C</a:t>
+            </a:r>
+            <a:r>
+              <a:rPr lang="hu-HU" dirty="0" err="1" smtClean="0"/>
+              <a:t>hitektúra</a:t>
             </a:r>
             <a:endParaRPr lang="hu-HU" dirty="0"/>
           </a:p>
@@ -6285,10 +6823,481 @@
           <a:lstStyle/>
           <a:p>
             <a:r>
-              <a:rPr lang="hu-HU" dirty="0" smtClean="0"/>
-              <a:t>Megvalósítás</a:t>
+              <a:rPr lang="en-US" dirty="0" smtClean="0"/>
+              <a:t>MEGJELENÍTÉS</a:t>
             </a:r>
             <a:endParaRPr lang="hu-HU" dirty="0"/>
+          </a:p>
+        </p:txBody>
+      </p:sp>
+      <p:pic>
+        <p:nvPicPr>
+          <p:cNvPr id="5" name="Kép 4"/>
+          <p:cNvPicPr>
+            <a:picLocks noChangeAspect="1"/>
+          </p:cNvPicPr>
+          <p:nvPr/>
+        </p:nvPicPr>
+        <p:blipFill>
+          <a:blip r:embed="rId3">
+            <a:extLst>
+              <a:ext uri="{28A0092B-C50C-407E-A947-70E740481C1C}">
+                <a14:useLocalDpi xmlns:a14="http://schemas.microsoft.com/office/drawing/2010/main" val="0"/>
+              </a:ext>
+            </a:extLst>
+          </a:blip>
+          <a:stretch>
+            <a:fillRect/>
+          </a:stretch>
+        </p:blipFill>
+        <p:spPr>
+          <a:xfrm>
+            <a:off x="4973615" y="1052736"/>
+            <a:ext cx="3370285" cy="3220968"/>
+          </a:xfrm>
+          <a:prstGeom prst="rect">
+            <a:avLst/>
+          </a:prstGeom>
+        </p:spPr>
+      </p:pic>
+      <p:pic>
+        <p:nvPicPr>
+          <p:cNvPr id="3" name="Kép 2"/>
+          <p:cNvPicPr>
+            <a:picLocks noChangeAspect="1"/>
+          </p:cNvPicPr>
+          <p:nvPr/>
+        </p:nvPicPr>
+        <p:blipFill>
+          <a:blip r:embed="rId4" cstate="print">
+            <a:extLst>
+              <a:ext uri="{28A0092B-C50C-407E-A947-70E740481C1C}">
+                <a14:useLocalDpi xmlns:a14="http://schemas.microsoft.com/office/drawing/2010/main" val="0"/>
+              </a:ext>
+            </a:extLst>
+          </a:blip>
+          <a:stretch>
+            <a:fillRect/>
+          </a:stretch>
+        </p:blipFill>
+        <p:spPr>
+          <a:xfrm>
+            <a:off x="6012160" y="3979901"/>
+            <a:ext cx="1324876" cy="745243"/>
+          </a:xfrm>
+          <a:prstGeom prst="rect">
+            <a:avLst/>
+          </a:prstGeom>
+        </p:spPr>
+      </p:pic>
+      <p:pic>
+        <p:nvPicPr>
+          <p:cNvPr id="6" name="Kép 5"/>
+          <p:cNvPicPr>
+            <a:picLocks noChangeAspect="1"/>
+          </p:cNvPicPr>
+          <p:nvPr/>
+        </p:nvPicPr>
+        <p:blipFill>
+          <a:blip r:embed="rId5" cstate="print">
+            <a:extLst>
+              <a:ext uri="{28A0092B-C50C-407E-A947-70E740481C1C}">
+                <a14:useLocalDpi xmlns:a14="http://schemas.microsoft.com/office/drawing/2010/main" val="0"/>
+              </a:ext>
+            </a:extLst>
+          </a:blip>
+          <a:stretch>
+            <a:fillRect/>
+          </a:stretch>
+        </p:blipFill>
+        <p:spPr>
+          <a:xfrm>
+            <a:off x="7872945" y="2810060"/>
+            <a:ext cx="1096726" cy="1169841"/>
+          </a:xfrm>
+          <a:prstGeom prst="rect">
+            <a:avLst/>
+          </a:prstGeom>
+        </p:spPr>
+      </p:pic>
+      <p:pic>
+        <p:nvPicPr>
+          <p:cNvPr id="7" name="Kép 6"/>
+          <p:cNvPicPr>
+            <a:picLocks noChangeAspect="1"/>
+          </p:cNvPicPr>
+          <p:nvPr/>
+        </p:nvPicPr>
+        <p:blipFill>
+          <a:blip r:embed="rId6" cstate="print">
+            <a:extLst>
+              <a:ext uri="{28A0092B-C50C-407E-A947-70E740481C1C}">
+                <a14:useLocalDpi xmlns:a14="http://schemas.microsoft.com/office/drawing/2010/main" val="0"/>
+              </a:ext>
+            </a:extLst>
+          </a:blip>
+          <a:stretch>
+            <a:fillRect/>
+          </a:stretch>
+        </p:blipFill>
+        <p:spPr>
+          <a:xfrm>
+            <a:off x="2584657" y="1744447"/>
+            <a:ext cx="1080120" cy="572463"/>
+          </a:xfrm>
+          <a:prstGeom prst="rect">
+            <a:avLst/>
+          </a:prstGeom>
+        </p:spPr>
+      </p:pic>
+      <p:pic>
+        <p:nvPicPr>
+          <p:cNvPr id="8" name="Kép 7"/>
+          <p:cNvPicPr>
+            <a:picLocks noChangeAspect="1"/>
+          </p:cNvPicPr>
+          <p:nvPr/>
+        </p:nvPicPr>
+        <p:blipFill>
+          <a:blip r:embed="rId7" cstate="print">
+            <a:extLst>
+              <a:ext uri="{28A0092B-C50C-407E-A947-70E740481C1C}">
+                <a14:useLocalDpi xmlns:a14="http://schemas.microsoft.com/office/drawing/2010/main" val="0"/>
+              </a:ext>
+            </a:extLst>
+          </a:blip>
+          <a:stretch>
+            <a:fillRect/>
+          </a:stretch>
+        </p:blipFill>
+        <p:spPr>
+          <a:xfrm>
+            <a:off x="656354" y="1562627"/>
+            <a:ext cx="936104" cy="936104"/>
+          </a:xfrm>
+          <a:prstGeom prst="rect">
+            <a:avLst/>
+          </a:prstGeom>
+        </p:spPr>
+      </p:pic>
+      <p:sp>
+        <p:nvSpPr>
+          <p:cNvPr id="9" name="Szövegdoboz 8"/>
+          <p:cNvSpPr txBox="1"/>
+          <p:nvPr/>
+        </p:nvSpPr>
+        <p:spPr>
+          <a:xfrm>
+            <a:off x="887803" y="2420528"/>
+            <a:ext cx="473206" cy="369332"/>
+          </a:xfrm>
+          <a:prstGeom prst="rect">
+            <a:avLst/>
+          </a:prstGeom>
+          <a:noFill/>
+        </p:spPr>
+        <p:txBody>
+          <a:bodyPr wrap="none" rtlCol="0">
+            <a:spAutoFit/>
+          </a:bodyPr>
+          <a:lstStyle/>
+          <a:p>
+            <a:r>
+              <a:rPr lang="en-US" dirty="0" smtClean="0"/>
+              <a:t>DB</a:t>
+            </a:r>
+            <a:endParaRPr lang="en-US" dirty="0"/>
+          </a:p>
+        </p:txBody>
+      </p:sp>
+      <p:sp>
+        <p:nvSpPr>
+          <p:cNvPr id="10" name="Szövegdoboz 9"/>
+          <p:cNvSpPr txBox="1"/>
+          <p:nvPr/>
+        </p:nvSpPr>
+        <p:spPr>
+          <a:xfrm>
+            <a:off x="1413778" y="3388602"/>
+            <a:ext cx="3320012" cy="646331"/>
+          </a:xfrm>
+          <a:prstGeom prst="rect">
+            <a:avLst/>
+          </a:prstGeom>
+          <a:noFill/>
+        </p:spPr>
+        <p:txBody>
+          <a:bodyPr wrap="none" rtlCol="0">
+            <a:spAutoFit/>
+          </a:bodyPr>
+          <a:lstStyle/>
+          <a:p>
+            <a:pPr algn="ctr"/>
+            <a:r>
+              <a:rPr lang="en-US" b="1" dirty="0" smtClean="0"/>
+              <a:t>modules.ini</a:t>
+            </a:r>
+          </a:p>
+          <a:p>
+            <a:pPr algn="ctr"/>
+            <a:r>
+              <a:rPr lang="en-US" dirty="0" smtClean="0"/>
+              <a:t>(</a:t>
+            </a:r>
+            <a:r>
+              <a:rPr lang="en-US" dirty="0" err="1" smtClean="0"/>
+              <a:t>modulok</a:t>
+            </a:r>
+            <a:r>
+              <a:rPr lang="en-US" dirty="0" smtClean="0"/>
+              <a:t> + </a:t>
+            </a:r>
+            <a:r>
+              <a:rPr lang="en-US" dirty="0" err="1" smtClean="0"/>
+              <a:t>felhasználói</a:t>
+            </a:r>
+            <a:r>
+              <a:rPr lang="en-US" dirty="0" smtClean="0"/>
+              <a:t> </a:t>
+            </a:r>
+            <a:r>
+              <a:rPr lang="en-US" dirty="0" err="1" smtClean="0"/>
+              <a:t>szintek</a:t>
+            </a:r>
+            <a:r>
+              <a:rPr lang="en-US" dirty="0" smtClean="0"/>
+              <a:t>)</a:t>
+            </a:r>
+            <a:endParaRPr lang="en-US" dirty="0"/>
+          </a:p>
+        </p:txBody>
+      </p:sp>
+      <p:pic>
+        <p:nvPicPr>
+          <p:cNvPr id="13" name="Kép 12"/>
+          <p:cNvPicPr>
+            <a:picLocks noChangeAspect="1"/>
+          </p:cNvPicPr>
+          <p:nvPr/>
+        </p:nvPicPr>
+        <p:blipFill>
+          <a:blip r:embed="rId8">
+            <a:extLst>
+              <a:ext uri="{28A0092B-C50C-407E-A947-70E740481C1C}">
+                <a14:useLocalDpi xmlns:a14="http://schemas.microsoft.com/office/drawing/2010/main" val="0"/>
+              </a:ext>
+            </a:extLst>
+          </a:blip>
+          <a:stretch>
+            <a:fillRect/>
+          </a:stretch>
+        </p:blipFill>
+        <p:spPr>
+          <a:xfrm rot="15249853">
+            <a:off x="1655108" y="2591911"/>
+            <a:ext cx="919022" cy="656444"/>
+          </a:xfrm>
+          <a:prstGeom prst="rect">
+            <a:avLst/>
+          </a:prstGeom>
+        </p:spPr>
+      </p:pic>
+      <p:cxnSp>
+        <p:nvCxnSpPr>
+          <p:cNvPr id="15" name="Egyenes összekötő nyíllal 14"/>
+          <p:cNvCxnSpPr/>
+          <p:nvPr/>
+        </p:nvCxnSpPr>
+        <p:spPr>
+          <a:xfrm>
+            <a:off x="3867354" y="1920885"/>
+            <a:ext cx="1712758" cy="0"/>
+          </a:xfrm>
+          <a:prstGeom prst="straightConnector1">
+            <a:avLst/>
+          </a:prstGeom>
+          <a:ln>
+            <a:solidFill>
+              <a:schemeClr val="tx1"/>
+            </a:solidFill>
+            <a:tailEnd type="triangle"/>
+          </a:ln>
+        </p:spPr>
+        <p:style>
+          <a:lnRef idx="1">
+            <a:schemeClr val="accent1"/>
+          </a:lnRef>
+          <a:fillRef idx="0">
+            <a:schemeClr val="accent1"/>
+          </a:fillRef>
+          <a:effectRef idx="0">
+            <a:schemeClr val="accent1"/>
+          </a:effectRef>
+          <a:fontRef idx="minor">
+            <a:schemeClr val="tx1"/>
+          </a:fontRef>
+        </p:style>
+      </p:cxnSp>
+      <p:cxnSp>
+        <p:nvCxnSpPr>
+          <p:cNvPr id="18" name="Egyenes összekötő nyíllal 17"/>
+          <p:cNvCxnSpPr/>
+          <p:nvPr/>
+        </p:nvCxnSpPr>
+        <p:spPr>
+          <a:xfrm>
+            <a:off x="1763688" y="1920885"/>
+            <a:ext cx="720080" cy="0"/>
+          </a:xfrm>
+          <a:prstGeom prst="straightConnector1">
+            <a:avLst/>
+          </a:prstGeom>
+          <a:ln>
+            <a:solidFill>
+              <a:schemeClr val="tx1"/>
+            </a:solidFill>
+            <a:headEnd type="triangle"/>
+            <a:tailEnd type="triangle"/>
+          </a:ln>
+        </p:spPr>
+        <p:style>
+          <a:lnRef idx="1">
+            <a:schemeClr val="accent1"/>
+          </a:lnRef>
+          <a:fillRef idx="0">
+            <a:schemeClr val="accent1"/>
+          </a:fillRef>
+          <a:effectRef idx="0">
+            <a:schemeClr val="accent1"/>
+          </a:effectRef>
+          <a:fontRef idx="minor">
+            <a:schemeClr val="tx1"/>
+          </a:fontRef>
+        </p:style>
+      </p:cxnSp>
+      <p:cxnSp>
+        <p:nvCxnSpPr>
+          <p:cNvPr id="20" name="Egyenes összekötő nyíllal 19"/>
+          <p:cNvCxnSpPr/>
+          <p:nvPr/>
+        </p:nvCxnSpPr>
+        <p:spPr>
+          <a:xfrm flipV="1">
+            <a:off x="3124717" y="2420528"/>
+            <a:ext cx="0" cy="864456"/>
+          </a:xfrm>
+          <a:prstGeom prst="straightConnector1">
+            <a:avLst/>
+          </a:prstGeom>
+          <a:ln>
+            <a:solidFill>
+              <a:schemeClr val="tx1"/>
+            </a:solidFill>
+            <a:tailEnd type="triangle"/>
+          </a:ln>
+        </p:spPr>
+        <p:style>
+          <a:lnRef idx="1">
+            <a:schemeClr val="accent1"/>
+          </a:lnRef>
+          <a:fillRef idx="0">
+            <a:schemeClr val="accent1"/>
+          </a:fillRef>
+          <a:effectRef idx="0">
+            <a:schemeClr val="accent1"/>
+          </a:effectRef>
+          <a:fontRef idx="minor">
+            <a:schemeClr val="tx1"/>
+          </a:fontRef>
+        </p:style>
+      </p:cxnSp>
+      <p:pic>
+        <p:nvPicPr>
+          <p:cNvPr id="24" name="Kép 23"/>
+          <p:cNvPicPr>
+            <a:picLocks noChangeAspect="1"/>
+          </p:cNvPicPr>
+          <p:nvPr/>
+        </p:nvPicPr>
+        <p:blipFill>
+          <a:blip r:embed="rId9">
+            <a:extLst>
+              <a:ext uri="{28A0092B-C50C-407E-A947-70E740481C1C}">
+                <a14:useLocalDpi xmlns:a14="http://schemas.microsoft.com/office/drawing/2010/main" val="0"/>
+              </a:ext>
+            </a:extLst>
+          </a:blip>
+          <a:stretch>
+            <a:fillRect/>
+          </a:stretch>
+        </p:blipFill>
+        <p:spPr>
+          <a:xfrm>
+            <a:off x="4450424" y="836711"/>
+            <a:ext cx="902364" cy="4218031"/>
+          </a:xfrm>
+          <a:prstGeom prst="rect">
+            <a:avLst/>
+          </a:prstGeom>
+        </p:spPr>
+      </p:pic>
+      <p:sp>
+        <p:nvSpPr>
+          <p:cNvPr id="25" name="Szövegdoboz 24"/>
+          <p:cNvSpPr txBox="1"/>
+          <p:nvPr/>
+        </p:nvSpPr>
+        <p:spPr>
+          <a:xfrm>
+            <a:off x="4990567" y="4633552"/>
+            <a:ext cx="758541" cy="369332"/>
+          </a:xfrm>
+          <a:prstGeom prst="rect">
+            <a:avLst/>
+          </a:prstGeom>
+          <a:noFill/>
+        </p:spPr>
+        <p:txBody>
+          <a:bodyPr wrap="none" rtlCol="0">
+            <a:spAutoFit/>
+          </a:bodyPr>
+          <a:lstStyle/>
+          <a:p>
+            <a:r>
+              <a:rPr lang="en-US" dirty="0" err="1" smtClean="0"/>
+              <a:t>kliens</a:t>
+            </a:r>
+            <a:endParaRPr lang="en-US" dirty="0"/>
+          </a:p>
+        </p:txBody>
+      </p:sp>
+      <p:sp>
+        <p:nvSpPr>
+          <p:cNvPr id="26" name="Szövegdoboz 25"/>
+          <p:cNvSpPr txBox="1"/>
+          <p:nvPr/>
+        </p:nvSpPr>
+        <p:spPr>
+          <a:xfrm>
+            <a:off x="3930351" y="4633552"/>
+            <a:ext cx="887679" cy="369332"/>
+          </a:xfrm>
+          <a:prstGeom prst="rect">
+            <a:avLst/>
+          </a:prstGeom>
+          <a:noFill/>
+        </p:spPr>
+        <p:txBody>
+          <a:bodyPr wrap="none" rtlCol="0">
+            <a:spAutoFit/>
+          </a:bodyPr>
+          <a:lstStyle/>
+          <a:p>
+            <a:r>
+              <a:rPr lang="en-US" dirty="0" err="1" smtClean="0"/>
+              <a:t>szerver</a:t>
+            </a:r>
+            <a:endParaRPr lang="en-US" dirty="0"/>
           </a:p>
         </p:txBody>
       </p:sp>
@@ -6296,6 +7305,1633 @@
     <p:extLst>
       <p:ext uri="{BB962C8B-B14F-4D97-AF65-F5344CB8AC3E}">
         <p14:creationId xmlns:p14="http://schemas.microsoft.com/office/powerpoint/2010/main" val="1231499071"/>
+      </p:ext>
+    </p:extLst>
+  </p:cSld>
+  <p:clrMapOvr>
+    <a:masterClrMapping/>
+  </p:clrMapOvr>
+  <p:timing>
+    <p:tnLst>
+      <p:par>
+        <p:cTn id="1" dur="indefinite" restart="never" nodeType="tmRoot">
+          <p:childTnLst>
+            <p:seq concurrent="1" nextAc="seek">
+              <p:cTn id="2" dur="indefinite" nodeType="mainSeq">
+                <p:childTnLst>
+                  <p:par>
+                    <p:cTn id="3" fill="hold">
+                      <p:stCondLst>
+                        <p:cond delay="indefinite"/>
+                      </p:stCondLst>
+                      <p:childTnLst>
+                        <p:par>
+                          <p:cTn id="4" fill="hold">
+                            <p:stCondLst>
+                              <p:cond delay="0"/>
+                            </p:stCondLst>
+                            <p:childTnLst>
+                              <p:par>
+                                <p:cTn id="5" presetID="1" presetClass="entr" presetSubtype="0" fill="hold" grpId="0" nodeType="clickEffect">
+                                  <p:stCondLst>
+                                    <p:cond delay="0"/>
+                                  </p:stCondLst>
+                                  <p:childTnLst>
+                                    <p:set>
+                                      <p:cBhvr>
+                                        <p:cTn id="6" dur="1" fill="hold">
+                                          <p:stCondLst>
+                                            <p:cond delay="0"/>
+                                          </p:stCondLst>
+                                        </p:cTn>
+                                        <p:tgtEl>
+                                          <p:spTgt spid="10"/>
+                                        </p:tgtEl>
+                                        <p:attrNameLst>
+                                          <p:attrName>style.visibility</p:attrName>
+                                        </p:attrNameLst>
+                                      </p:cBhvr>
+                                      <p:to>
+                                        <p:strVal val="visible"/>
+                                      </p:to>
+                                    </p:set>
+                                  </p:childTnLst>
+                                </p:cTn>
+                              </p:par>
+                              <p:par>
+                                <p:cTn id="7" presetID="1" presetClass="entr" presetSubtype="0" fill="hold" nodeType="withEffect">
+                                  <p:stCondLst>
+                                    <p:cond delay="0"/>
+                                  </p:stCondLst>
+                                  <p:childTnLst>
+                                    <p:set>
+                                      <p:cBhvr>
+                                        <p:cTn id="8" dur="1" fill="hold">
+                                          <p:stCondLst>
+                                            <p:cond delay="0"/>
+                                          </p:stCondLst>
+                                        </p:cTn>
+                                        <p:tgtEl>
+                                          <p:spTgt spid="13"/>
+                                        </p:tgtEl>
+                                        <p:attrNameLst>
+                                          <p:attrName>style.visibility</p:attrName>
+                                        </p:attrNameLst>
+                                      </p:cBhvr>
+                                      <p:to>
+                                        <p:strVal val="visible"/>
+                                      </p:to>
+                                    </p:set>
+                                  </p:childTnLst>
+                                </p:cTn>
+                              </p:par>
+                              <p:par>
+                                <p:cTn id="9" presetID="1" presetClass="entr" presetSubtype="0" fill="hold" grpId="0" nodeType="withEffect">
+                                  <p:stCondLst>
+                                    <p:cond delay="0"/>
+                                  </p:stCondLst>
+                                  <p:childTnLst>
+                                    <p:set>
+                                      <p:cBhvr>
+                                        <p:cTn id="10" dur="1" fill="hold">
+                                          <p:stCondLst>
+                                            <p:cond delay="0"/>
+                                          </p:stCondLst>
+                                        </p:cTn>
+                                        <p:tgtEl>
+                                          <p:spTgt spid="9"/>
+                                        </p:tgtEl>
+                                        <p:attrNameLst>
+                                          <p:attrName>style.visibility</p:attrName>
+                                        </p:attrNameLst>
+                                      </p:cBhvr>
+                                      <p:to>
+                                        <p:strVal val="visible"/>
+                                      </p:to>
+                                    </p:set>
+                                  </p:childTnLst>
+                                </p:cTn>
+                              </p:par>
+                              <p:par>
+                                <p:cTn id="11" presetID="1" presetClass="entr" presetSubtype="0" fill="hold" nodeType="withEffect">
+                                  <p:stCondLst>
+                                    <p:cond delay="0"/>
+                                  </p:stCondLst>
+                                  <p:childTnLst>
+                                    <p:set>
+                                      <p:cBhvr>
+                                        <p:cTn id="12" dur="1" fill="hold">
+                                          <p:stCondLst>
+                                            <p:cond delay="0"/>
+                                          </p:stCondLst>
+                                        </p:cTn>
+                                        <p:tgtEl>
+                                          <p:spTgt spid="8"/>
+                                        </p:tgtEl>
+                                        <p:attrNameLst>
+                                          <p:attrName>style.visibility</p:attrName>
+                                        </p:attrNameLst>
+                                      </p:cBhvr>
+                                      <p:to>
+                                        <p:strVal val="visible"/>
+                                      </p:to>
+                                    </p:set>
+                                  </p:childTnLst>
+                                </p:cTn>
+                              </p:par>
+                              <p:par>
+                                <p:cTn id="13" presetID="1" presetClass="entr" presetSubtype="0" fill="hold" nodeType="withEffect">
+                                  <p:stCondLst>
+                                    <p:cond delay="0"/>
+                                  </p:stCondLst>
+                                  <p:childTnLst>
+                                    <p:set>
+                                      <p:cBhvr>
+                                        <p:cTn id="14" dur="1" fill="hold">
+                                          <p:stCondLst>
+                                            <p:cond delay="0"/>
+                                          </p:stCondLst>
+                                        </p:cTn>
+                                        <p:tgtEl>
+                                          <p:spTgt spid="18"/>
+                                        </p:tgtEl>
+                                        <p:attrNameLst>
+                                          <p:attrName>style.visibility</p:attrName>
+                                        </p:attrNameLst>
+                                      </p:cBhvr>
+                                      <p:to>
+                                        <p:strVal val="visible"/>
+                                      </p:to>
+                                    </p:set>
+                                  </p:childTnLst>
+                                </p:cTn>
+                              </p:par>
+                              <p:par>
+                                <p:cTn id="15" presetID="1" presetClass="entr" presetSubtype="0" fill="hold" nodeType="withEffect">
+                                  <p:stCondLst>
+                                    <p:cond delay="0"/>
+                                  </p:stCondLst>
+                                  <p:childTnLst>
+                                    <p:set>
+                                      <p:cBhvr>
+                                        <p:cTn id="16" dur="1" fill="hold">
+                                          <p:stCondLst>
+                                            <p:cond delay="0"/>
+                                          </p:stCondLst>
+                                        </p:cTn>
+                                        <p:tgtEl>
+                                          <p:spTgt spid="7"/>
+                                        </p:tgtEl>
+                                        <p:attrNameLst>
+                                          <p:attrName>style.visibility</p:attrName>
+                                        </p:attrNameLst>
+                                      </p:cBhvr>
+                                      <p:to>
+                                        <p:strVal val="visible"/>
+                                      </p:to>
+                                    </p:set>
+                                  </p:childTnLst>
+                                </p:cTn>
+                              </p:par>
+                              <p:par>
+                                <p:cTn id="17" presetID="1" presetClass="entr" presetSubtype="0" fill="hold" nodeType="withEffect">
+                                  <p:stCondLst>
+                                    <p:cond delay="0"/>
+                                  </p:stCondLst>
+                                  <p:childTnLst>
+                                    <p:set>
+                                      <p:cBhvr>
+                                        <p:cTn id="18" dur="1" fill="hold">
+                                          <p:stCondLst>
+                                            <p:cond delay="0"/>
+                                          </p:stCondLst>
+                                        </p:cTn>
+                                        <p:tgtEl>
+                                          <p:spTgt spid="20"/>
+                                        </p:tgtEl>
+                                        <p:attrNameLst>
+                                          <p:attrName>style.visibility</p:attrName>
+                                        </p:attrNameLst>
+                                      </p:cBhvr>
+                                      <p:to>
+                                        <p:strVal val="visible"/>
+                                      </p:to>
+                                    </p:set>
+                                  </p:childTnLst>
+                                </p:cTn>
+                              </p:par>
+                              <p:par>
+                                <p:cTn id="19" presetID="1" presetClass="entr" presetSubtype="0" fill="hold" grpId="0" nodeType="withEffect">
+                                  <p:stCondLst>
+                                    <p:cond delay="0"/>
+                                  </p:stCondLst>
+                                  <p:childTnLst>
+                                    <p:set>
+                                      <p:cBhvr>
+                                        <p:cTn id="20" dur="1" fill="hold">
+                                          <p:stCondLst>
+                                            <p:cond delay="0"/>
+                                          </p:stCondLst>
+                                        </p:cTn>
+                                        <p:tgtEl>
+                                          <p:spTgt spid="26"/>
+                                        </p:tgtEl>
+                                        <p:attrNameLst>
+                                          <p:attrName>style.visibility</p:attrName>
+                                        </p:attrNameLst>
+                                      </p:cBhvr>
+                                      <p:to>
+                                        <p:strVal val="visible"/>
+                                      </p:to>
+                                    </p:set>
+                                  </p:childTnLst>
+                                </p:cTn>
+                              </p:par>
+                            </p:childTnLst>
+                          </p:cTn>
+                        </p:par>
+                      </p:childTnLst>
+                    </p:cTn>
+                  </p:par>
+                  <p:par>
+                    <p:cTn id="21" fill="hold">
+                      <p:stCondLst>
+                        <p:cond delay="indefinite"/>
+                      </p:stCondLst>
+                      <p:childTnLst>
+                        <p:par>
+                          <p:cTn id="22" fill="hold">
+                            <p:stCondLst>
+                              <p:cond delay="0"/>
+                            </p:stCondLst>
+                            <p:childTnLst>
+                              <p:par>
+                                <p:cTn id="23" presetID="1" presetClass="entr" presetSubtype="0" fill="hold" nodeType="clickEffect">
+                                  <p:stCondLst>
+                                    <p:cond delay="0"/>
+                                  </p:stCondLst>
+                                  <p:childTnLst>
+                                    <p:set>
+                                      <p:cBhvr>
+                                        <p:cTn id="24" dur="1" fill="hold">
+                                          <p:stCondLst>
+                                            <p:cond delay="0"/>
+                                          </p:stCondLst>
+                                        </p:cTn>
+                                        <p:tgtEl>
+                                          <p:spTgt spid="5"/>
+                                        </p:tgtEl>
+                                        <p:attrNameLst>
+                                          <p:attrName>style.visibility</p:attrName>
+                                        </p:attrNameLst>
+                                      </p:cBhvr>
+                                      <p:to>
+                                        <p:strVal val="visible"/>
+                                      </p:to>
+                                    </p:set>
+                                  </p:childTnLst>
+                                </p:cTn>
+                              </p:par>
+                              <p:par>
+                                <p:cTn id="25" presetID="1" presetClass="entr" presetSubtype="0" fill="hold" nodeType="withEffect">
+                                  <p:stCondLst>
+                                    <p:cond delay="0"/>
+                                  </p:stCondLst>
+                                  <p:childTnLst>
+                                    <p:set>
+                                      <p:cBhvr>
+                                        <p:cTn id="26" dur="1" fill="hold">
+                                          <p:stCondLst>
+                                            <p:cond delay="0"/>
+                                          </p:stCondLst>
+                                        </p:cTn>
+                                        <p:tgtEl>
+                                          <p:spTgt spid="24"/>
+                                        </p:tgtEl>
+                                        <p:attrNameLst>
+                                          <p:attrName>style.visibility</p:attrName>
+                                        </p:attrNameLst>
+                                      </p:cBhvr>
+                                      <p:to>
+                                        <p:strVal val="visible"/>
+                                      </p:to>
+                                    </p:set>
+                                  </p:childTnLst>
+                                </p:cTn>
+                              </p:par>
+                              <p:par>
+                                <p:cTn id="27" presetID="1" presetClass="entr" presetSubtype="0" fill="hold" grpId="0" nodeType="withEffect">
+                                  <p:stCondLst>
+                                    <p:cond delay="0"/>
+                                  </p:stCondLst>
+                                  <p:childTnLst>
+                                    <p:set>
+                                      <p:cBhvr>
+                                        <p:cTn id="28" dur="1" fill="hold">
+                                          <p:stCondLst>
+                                            <p:cond delay="0"/>
+                                          </p:stCondLst>
+                                        </p:cTn>
+                                        <p:tgtEl>
+                                          <p:spTgt spid="25"/>
+                                        </p:tgtEl>
+                                        <p:attrNameLst>
+                                          <p:attrName>style.visibility</p:attrName>
+                                        </p:attrNameLst>
+                                      </p:cBhvr>
+                                      <p:to>
+                                        <p:strVal val="visible"/>
+                                      </p:to>
+                                    </p:set>
+                                  </p:childTnLst>
+                                </p:cTn>
+                              </p:par>
+                              <p:par>
+                                <p:cTn id="29" presetID="1" presetClass="entr" presetSubtype="0" fill="hold" nodeType="withEffect">
+                                  <p:stCondLst>
+                                    <p:cond delay="0"/>
+                                  </p:stCondLst>
+                                  <p:childTnLst>
+                                    <p:set>
+                                      <p:cBhvr>
+                                        <p:cTn id="30" dur="1" fill="hold">
+                                          <p:stCondLst>
+                                            <p:cond delay="0"/>
+                                          </p:stCondLst>
+                                        </p:cTn>
+                                        <p:tgtEl>
+                                          <p:spTgt spid="3"/>
+                                        </p:tgtEl>
+                                        <p:attrNameLst>
+                                          <p:attrName>style.visibility</p:attrName>
+                                        </p:attrNameLst>
+                                      </p:cBhvr>
+                                      <p:to>
+                                        <p:strVal val="visible"/>
+                                      </p:to>
+                                    </p:set>
+                                  </p:childTnLst>
+                                </p:cTn>
+                              </p:par>
+                              <p:par>
+                                <p:cTn id="31" presetID="1" presetClass="entr" presetSubtype="0" fill="hold" nodeType="withEffect">
+                                  <p:stCondLst>
+                                    <p:cond delay="0"/>
+                                  </p:stCondLst>
+                                  <p:childTnLst>
+                                    <p:set>
+                                      <p:cBhvr>
+                                        <p:cTn id="32" dur="1" fill="hold">
+                                          <p:stCondLst>
+                                            <p:cond delay="0"/>
+                                          </p:stCondLst>
+                                        </p:cTn>
+                                        <p:tgtEl>
+                                          <p:spTgt spid="6"/>
+                                        </p:tgtEl>
+                                        <p:attrNameLst>
+                                          <p:attrName>style.visibility</p:attrName>
+                                        </p:attrNameLst>
+                                      </p:cBhvr>
+                                      <p:to>
+                                        <p:strVal val="visible"/>
+                                      </p:to>
+                                    </p:set>
+                                  </p:childTnLst>
+                                </p:cTn>
+                              </p:par>
+                            </p:childTnLst>
+                          </p:cTn>
+                        </p:par>
+                      </p:childTnLst>
+                    </p:cTn>
+                  </p:par>
+                </p:childTnLst>
+              </p:cTn>
+              <p:prevCondLst>
+                <p:cond evt="onPrev" delay="0">
+                  <p:tgtEl>
+                    <p:sldTgt/>
+                  </p:tgtEl>
+                </p:cond>
+              </p:prevCondLst>
+              <p:nextCondLst>
+                <p:cond evt="onNext" delay="0">
+                  <p:tgtEl>
+                    <p:sldTgt/>
+                  </p:tgtEl>
+                </p:cond>
+              </p:nextCondLst>
+            </p:seq>
+          </p:childTnLst>
+        </p:cTn>
+      </p:par>
+    </p:tnLst>
+    <p:bldLst>
+      <p:bldP spid="9" grpId="0"/>
+      <p:bldP spid="10" grpId="0"/>
+      <p:bldP spid="25" grpId="0"/>
+      <p:bldP spid="26" grpId="0"/>
+    </p:bldLst>
+  </p:timing>
+</p:sld>
+</file>
+
+<file path=ppt/slides/slide5.xml><?xml version="1.0" encoding="utf-8"?>
+<p:sld xmlns:a="http://schemas.openxmlformats.org/drawingml/2006/main" xmlns:r="http://schemas.openxmlformats.org/officeDocument/2006/relationships" xmlns:p="http://schemas.openxmlformats.org/presentationml/2006/main">
+  <p:cSld>
+    <p:spTree>
+      <p:nvGrpSpPr>
+        <p:cNvPr id="1" name=""/>
+        <p:cNvGrpSpPr/>
+        <p:nvPr/>
+      </p:nvGrpSpPr>
+      <p:grpSpPr>
+        <a:xfrm>
+          <a:off x="0" y="0"/>
+          <a:ext cx="0" cy="0"/>
+          <a:chOff x="0" y="0"/>
+          <a:chExt cx="0" cy="0"/>
+        </a:xfrm>
+      </p:grpSpPr>
+      <p:sp>
+        <p:nvSpPr>
+          <p:cNvPr id="2" name="Cím 1"/>
+          <p:cNvSpPr>
+            <a:spLocks noGrp="1"/>
+          </p:cNvSpPr>
+          <p:nvPr>
+            <p:ph type="title"/>
+          </p:nvPr>
+        </p:nvSpPr>
+        <p:spPr/>
+        <p:txBody>
+          <a:bodyPr/>
+          <a:lstStyle/>
+          <a:p>
+            <a:r>
+              <a:rPr lang="en-US" dirty="0" smtClean="0"/>
+              <a:t>ADATELÉRÉS ÉS MANIPULÁCIÓ</a:t>
+            </a:r>
+            <a:endParaRPr lang="hu-HU" dirty="0"/>
+          </a:p>
+        </p:txBody>
+      </p:sp>
+      <p:pic>
+        <p:nvPicPr>
+          <p:cNvPr id="4" name="Kép 3"/>
+          <p:cNvPicPr>
+            <a:picLocks noChangeAspect="1"/>
+          </p:cNvPicPr>
+          <p:nvPr/>
+        </p:nvPicPr>
+        <p:blipFill rotWithShape="1">
+          <a:blip r:embed="rId3"/>
+          <a:srcRect b="39655"/>
+          <a:stretch/>
+        </p:blipFill>
+        <p:spPr>
+          <a:xfrm>
+            <a:off x="133979" y="1163889"/>
+            <a:ext cx="6192688" cy="2458683"/>
+          </a:xfrm>
+          <a:prstGeom prst="rect">
+            <a:avLst/>
+          </a:prstGeom>
+        </p:spPr>
+      </p:pic>
+      <p:pic>
+        <p:nvPicPr>
+          <p:cNvPr id="16" name="Kép 15"/>
+          <p:cNvPicPr>
+            <a:picLocks noChangeAspect="1"/>
+          </p:cNvPicPr>
+          <p:nvPr/>
+        </p:nvPicPr>
+        <p:blipFill>
+          <a:blip r:embed="rId4">
+            <a:extLst>
+              <a:ext uri="{28A0092B-C50C-407E-A947-70E740481C1C}">
+                <a14:useLocalDpi xmlns:a14="http://schemas.microsoft.com/office/drawing/2010/main" val="0"/>
+              </a:ext>
+            </a:extLst>
+          </a:blip>
+          <a:stretch>
+            <a:fillRect/>
+          </a:stretch>
+        </p:blipFill>
+        <p:spPr>
+          <a:xfrm>
+            <a:off x="5959764" y="1768857"/>
+            <a:ext cx="1368152" cy="936104"/>
+          </a:xfrm>
+          <a:prstGeom prst="rect">
+            <a:avLst/>
+          </a:prstGeom>
+        </p:spPr>
+      </p:pic>
+      <p:pic>
+        <p:nvPicPr>
+          <p:cNvPr id="19" name="Kép 18"/>
+          <p:cNvPicPr>
+            <a:picLocks noChangeAspect="1"/>
+          </p:cNvPicPr>
+          <p:nvPr/>
+        </p:nvPicPr>
+        <p:blipFill>
+          <a:blip r:embed="rId5" cstate="print">
+            <a:extLst>
+              <a:ext uri="{28A0092B-C50C-407E-A947-70E740481C1C}">
+                <a14:useLocalDpi xmlns:a14="http://schemas.microsoft.com/office/drawing/2010/main" val="0"/>
+              </a:ext>
+            </a:extLst>
+          </a:blip>
+          <a:stretch>
+            <a:fillRect/>
+          </a:stretch>
+        </p:blipFill>
+        <p:spPr>
+          <a:xfrm>
+            <a:off x="7495971" y="3743753"/>
+            <a:ext cx="936104" cy="936104"/>
+          </a:xfrm>
+          <a:prstGeom prst="rect">
+            <a:avLst/>
+          </a:prstGeom>
+        </p:spPr>
+      </p:pic>
+      <p:sp>
+        <p:nvSpPr>
+          <p:cNvPr id="21" name="Szövegdoboz 20"/>
+          <p:cNvSpPr txBox="1"/>
+          <p:nvPr/>
+        </p:nvSpPr>
+        <p:spPr>
+          <a:xfrm>
+            <a:off x="7727420" y="4601654"/>
+            <a:ext cx="473206" cy="369332"/>
+          </a:xfrm>
+          <a:prstGeom prst="rect">
+            <a:avLst/>
+          </a:prstGeom>
+          <a:noFill/>
+        </p:spPr>
+        <p:txBody>
+          <a:bodyPr wrap="none" rtlCol="0">
+            <a:spAutoFit/>
+          </a:bodyPr>
+          <a:lstStyle/>
+          <a:p>
+            <a:r>
+              <a:rPr lang="en-US" dirty="0" smtClean="0"/>
+              <a:t>DB</a:t>
+            </a:r>
+            <a:endParaRPr lang="en-US" dirty="0"/>
+          </a:p>
+        </p:txBody>
+      </p:sp>
+      <p:pic>
+        <p:nvPicPr>
+          <p:cNvPr id="22" name="Kép 21"/>
+          <p:cNvPicPr>
+            <a:picLocks noChangeAspect="1"/>
+          </p:cNvPicPr>
+          <p:nvPr/>
+        </p:nvPicPr>
+        <p:blipFill>
+          <a:blip r:embed="rId6" cstate="print">
+            <a:extLst>
+              <a:ext uri="{28A0092B-C50C-407E-A947-70E740481C1C}">
+                <a14:useLocalDpi xmlns:a14="http://schemas.microsoft.com/office/drawing/2010/main" val="0"/>
+              </a:ext>
+            </a:extLst>
+          </a:blip>
+          <a:stretch>
+            <a:fillRect/>
+          </a:stretch>
+        </p:blipFill>
+        <p:spPr>
+          <a:xfrm>
+            <a:off x="7423963" y="2107000"/>
+            <a:ext cx="1080120" cy="572463"/>
+          </a:xfrm>
+          <a:prstGeom prst="rect">
+            <a:avLst/>
+          </a:prstGeom>
+        </p:spPr>
+      </p:pic>
+      <p:pic>
+        <p:nvPicPr>
+          <p:cNvPr id="23" name="Kép 22"/>
+          <p:cNvPicPr>
+            <a:picLocks noChangeAspect="1"/>
+          </p:cNvPicPr>
+          <p:nvPr/>
+        </p:nvPicPr>
+        <p:blipFill>
+          <a:blip r:embed="rId4">
+            <a:extLst>
+              <a:ext uri="{28A0092B-C50C-407E-A947-70E740481C1C}">
+                <a14:useLocalDpi xmlns:a14="http://schemas.microsoft.com/office/drawing/2010/main" val="0"/>
+              </a:ext>
+            </a:extLst>
+          </a:blip>
+          <a:stretch>
+            <a:fillRect/>
+          </a:stretch>
+        </p:blipFill>
+        <p:spPr>
+          <a:xfrm rot="10800000">
+            <a:off x="5922108" y="2022089"/>
+            <a:ext cx="1368152" cy="936104"/>
+          </a:xfrm>
+          <a:prstGeom prst="rect">
+            <a:avLst/>
+          </a:prstGeom>
+        </p:spPr>
+      </p:pic>
+      <p:pic>
+        <p:nvPicPr>
+          <p:cNvPr id="24" name="Kép 23"/>
+          <p:cNvPicPr>
+            <a:picLocks noChangeAspect="1"/>
+          </p:cNvPicPr>
+          <p:nvPr/>
+        </p:nvPicPr>
+        <p:blipFill>
+          <a:blip r:embed="rId4" cstate="print">
+            <a:extLst>
+              <a:ext uri="{28A0092B-C50C-407E-A947-70E740481C1C}">
+                <a14:useLocalDpi xmlns:a14="http://schemas.microsoft.com/office/drawing/2010/main" val="0"/>
+              </a:ext>
+            </a:extLst>
+          </a:blip>
+          <a:stretch>
+            <a:fillRect/>
+          </a:stretch>
+        </p:blipFill>
+        <p:spPr>
+          <a:xfrm rot="16200000">
+            <a:off x="7625178" y="2751556"/>
+            <a:ext cx="901865" cy="936104"/>
+          </a:xfrm>
+          <a:prstGeom prst="rect">
+            <a:avLst/>
+          </a:prstGeom>
+        </p:spPr>
+      </p:pic>
+      <p:pic>
+        <p:nvPicPr>
+          <p:cNvPr id="25" name="Kép 24"/>
+          <p:cNvPicPr>
+            <a:picLocks noChangeAspect="1"/>
+          </p:cNvPicPr>
+          <p:nvPr/>
+        </p:nvPicPr>
+        <p:blipFill>
+          <a:blip r:embed="rId4" cstate="print">
+            <a:extLst>
+              <a:ext uri="{28A0092B-C50C-407E-A947-70E740481C1C}">
+                <a14:useLocalDpi xmlns:a14="http://schemas.microsoft.com/office/drawing/2010/main" val="0"/>
+              </a:ext>
+            </a:extLst>
+          </a:blip>
+          <a:stretch>
+            <a:fillRect/>
+          </a:stretch>
+        </p:blipFill>
+        <p:spPr>
+          <a:xfrm rot="5400000">
+            <a:off x="7269048" y="2764151"/>
+            <a:ext cx="927051" cy="936104"/>
+          </a:xfrm>
+          <a:prstGeom prst="rect">
+            <a:avLst/>
+          </a:prstGeom>
+        </p:spPr>
+      </p:pic>
+      <p:sp>
+        <p:nvSpPr>
+          <p:cNvPr id="17" name="Szövegdoboz 16"/>
+          <p:cNvSpPr txBox="1"/>
+          <p:nvPr/>
+        </p:nvSpPr>
+        <p:spPr>
+          <a:xfrm>
+            <a:off x="6374690" y="1660693"/>
+            <a:ext cx="1519198" cy="369332"/>
+          </a:xfrm>
+          <a:prstGeom prst="rect">
+            <a:avLst/>
+          </a:prstGeom>
+          <a:noFill/>
+        </p:spPr>
+        <p:txBody>
+          <a:bodyPr wrap="none" rtlCol="0">
+            <a:spAutoFit/>
+          </a:bodyPr>
+          <a:lstStyle/>
+          <a:p>
+            <a:r>
+              <a:rPr lang="en-US" dirty="0" smtClean="0"/>
+              <a:t>(</a:t>
+            </a:r>
+            <a:r>
+              <a:rPr lang="en-US" dirty="0" err="1" smtClean="0"/>
+              <a:t>autentikáció</a:t>
+            </a:r>
+            <a:r>
+              <a:rPr lang="en-US" dirty="0" smtClean="0"/>
+              <a:t>)</a:t>
+            </a:r>
+            <a:endParaRPr lang="en-US" dirty="0"/>
+          </a:p>
+        </p:txBody>
+      </p:sp>
+    </p:spTree>
+    <p:extLst>
+      <p:ext uri="{BB962C8B-B14F-4D97-AF65-F5344CB8AC3E}">
+        <p14:creationId xmlns:p14="http://schemas.microsoft.com/office/powerpoint/2010/main" val="3918856302"/>
+      </p:ext>
+    </p:extLst>
+  </p:cSld>
+  <p:clrMapOvr>
+    <a:masterClrMapping/>
+  </p:clrMapOvr>
+  <p:timing>
+    <p:tnLst>
+      <p:par>
+        <p:cTn id="1" dur="indefinite" restart="never" nodeType="tmRoot">
+          <p:childTnLst>
+            <p:seq concurrent="1" nextAc="seek">
+              <p:cTn id="2" dur="indefinite" nodeType="mainSeq">
+                <p:childTnLst>
+                  <p:par>
+                    <p:cTn id="3" fill="hold">
+                      <p:stCondLst>
+                        <p:cond delay="indefinite"/>
+                      </p:stCondLst>
+                      <p:childTnLst>
+                        <p:par>
+                          <p:cTn id="4" fill="hold">
+                            <p:stCondLst>
+                              <p:cond delay="0"/>
+                            </p:stCondLst>
+                            <p:childTnLst>
+                              <p:par>
+                                <p:cTn id="5" presetID="1" presetClass="entr" presetSubtype="0" fill="hold" nodeType="clickEffect">
+                                  <p:stCondLst>
+                                    <p:cond delay="0"/>
+                                  </p:stCondLst>
+                                  <p:childTnLst>
+                                    <p:set>
+                                      <p:cBhvr>
+                                        <p:cTn id="6" dur="1" fill="hold">
+                                          <p:stCondLst>
+                                            <p:cond delay="0"/>
+                                          </p:stCondLst>
+                                        </p:cTn>
+                                        <p:tgtEl>
+                                          <p:spTgt spid="4"/>
+                                        </p:tgtEl>
+                                        <p:attrNameLst>
+                                          <p:attrName>style.visibility</p:attrName>
+                                        </p:attrNameLst>
+                                      </p:cBhvr>
+                                      <p:to>
+                                        <p:strVal val="visible"/>
+                                      </p:to>
+                                    </p:set>
+                                  </p:childTnLst>
+                                </p:cTn>
+                              </p:par>
+                            </p:childTnLst>
+                          </p:cTn>
+                        </p:par>
+                      </p:childTnLst>
+                    </p:cTn>
+                  </p:par>
+                  <p:par>
+                    <p:cTn id="7" fill="hold">
+                      <p:stCondLst>
+                        <p:cond delay="indefinite"/>
+                      </p:stCondLst>
+                      <p:childTnLst>
+                        <p:par>
+                          <p:cTn id="8" fill="hold">
+                            <p:stCondLst>
+                              <p:cond delay="0"/>
+                            </p:stCondLst>
+                            <p:childTnLst>
+                              <p:par>
+                                <p:cTn id="9" presetID="1" presetClass="entr" presetSubtype="0" fill="hold" nodeType="clickEffect">
+                                  <p:stCondLst>
+                                    <p:cond delay="0"/>
+                                  </p:stCondLst>
+                                  <p:childTnLst>
+                                    <p:set>
+                                      <p:cBhvr>
+                                        <p:cTn id="10" dur="1" fill="hold">
+                                          <p:stCondLst>
+                                            <p:cond delay="0"/>
+                                          </p:stCondLst>
+                                        </p:cTn>
+                                        <p:tgtEl>
+                                          <p:spTgt spid="16"/>
+                                        </p:tgtEl>
+                                        <p:attrNameLst>
+                                          <p:attrName>style.visibility</p:attrName>
+                                        </p:attrNameLst>
+                                      </p:cBhvr>
+                                      <p:to>
+                                        <p:strVal val="visible"/>
+                                      </p:to>
+                                    </p:set>
+                                  </p:childTnLst>
+                                </p:cTn>
+                              </p:par>
+                              <p:par>
+                                <p:cTn id="11" presetID="1" presetClass="entr" presetSubtype="0" fill="hold" nodeType="withEffect">
+                                  <p:stCondLst>
+                                    <p:cond delay="0"/>
+                                  </p:stCondLst>
+                                  <p:childTnLst>
+                                    <p:set>
+                                      <p:cBhvr>
+                                        <p:cTn id="12" dur="1" fill="hold">
+                                          <p:stCondLst>
+                                            <p:cond delay="0"/>
+                                          </p:stCondLst>
+                                        </p:cTn>
+                                        <p:tgtEl>
+                                          <p:spTgt spid="19"/>
+                                        </p:tgtEl>
+                                        <p:attrNameLst>
+                                          <p:attrName>style.visibility</p:attrName>
+                                        </p:attrNameLst>
+                                      </p:cBhvr>
+                                      <p:to>
+                                        <p:strVal val="visible"/>
+                                      </p:to>
+                                    </p:set>
+                                  </p:childTnLst>
+                                </p:cTn>
+                              </p:par>
+                              <p:par>
+                                <p:cTn id="13" presetID="1" presetClass="entr" presetSubtype="0" fill="hold" grpId="0" nodeType="withEffect">
+                                  <p:stCondLst>
+                                    <p:cond delay="0"/>
+                                  </p:stCondLst>
+                                  <p:childTnLst>
+                                    <p:set>
+                                      <p:cBhvr>
+                                        <p:cTn id="14" dur="1" fill="hold">
+                                          <p:stCondLst>
+                                            <p:cond delay="0"/>
+                                          </p:stCondLst>
+                                        </p:cTn>
+                                        <p:tgtEl>
+                                          <p:spTgt spid="21"/>
+                                        </p:tgtEl>
+                                        <p:attrNameLst>
+                                          <p:attrName>style.visibility</p:attrName>
+                                        </p:attrNameLst>
+                                      </p:cBhvr>
+                                      <p:to>
+                                        <p:strVal val="visible"/>
+                                      </p:to>
+                                    </p:set>
+                                  </p:childTnLst>
+                                </p:cTn>
+                              </p:par>
+                              <p:par>
+                                <p:cTn id="15" presetID="1" presetClass="entr" presetSubtype="0" fill="hold" nodeType="withEffect">
+                                  <p:stCondLst>
+                                    <p:cond delay="0"/>
+                                  </p:stCondLst>
+                                  <p:childTnLst>
+                                    <p:set>
+                                      <p:cBhvr>
+                                        <p:cTn id="16" dur="1" fill="hold">
+                                          <p:stCondLst>
+                                            <p:cond delay="0"/>
+                                          </p:stCondLst>
+                                        </p:cTn>
+                                        <p:tgtEl>
+                                          <p:spTgt spid="22"/>
+                                        </p:tgtEl>
+                                        <p:attrNameLst>
+                                          <p:attrName>style.visibility</p:attrName>
+                                        </p:attrNameLst>
+                                      </p:cBhvr>
+                                      <p:to>
+                                        <p:strVal val="visible"/>
+                                      </p:to>
+                                    </p:set>
+                                  </p:childTnLst>
+                                </p:cTn>
+                              </p:par>
+                              <p:par>
+                                <p:cTn id="17" presetID="1" presetClass="entr" presetSubtype="0" fill="hold" nodeType="withEffect">
+                                  <p:stCondLst>
+                                    <p:cond delay="0"/>
+                                  </p:stCondLst>
+                                  <p:childTnLst>
+                                    <p:set>
+                                      <p:cBhvr>
+                                        <p:cTn id="18" dur="1" fill="hold">
+                                          <p:stCondLst>
+                                            <p:cond delay="0"/>
+                                          </p:stCondLst>
+                                        </p:cTn>
+                                        <p:tgtEl>
+                                          <p:spTgt spid="23"/>
+                                        </p:tgtEl>
+                                        <p:attrNameLst>
+                                          <p:attrName>style.visibility</p:attrName>
+                                        </p:attrNameLst>
+                                      </p:cBhvr>
+                                      <p:to>
+                                        <p:strVal val="visible"/>
+                                      </p:to>
+                                    </p:set>
+                                  </p:childTnLst>
+                                </p:cTn>
+                              </p:par>
+                              <p:par>
+                                <p:cTn id="19" presetID="1" presetClass="entr" presetSubtype="0" fill="hold" nodeType="withEffect">
+                                  <p:stCondLst>
+                                    <p:cond delay="0"/>
+                                  </p:stCondLst>
+                                  <p:childTnLst>
+                                    <p:set>
+                                      <p:cBhvr>
+                                        <p:cTn id="20" dur="1" fill="hold">
+                                          <p:stCondLst>
+                                            <p:cond delay="0"/>
+                                          </p:stCondLst>
+                                        </p:cTn>
+                                        <p:tgtEl>
+                                          <p:spTgt spid="24"/>
+                                        </p:tgtEl>
+                                        <p:attrNameLst>
+                                          <p:attrName>style.visibility</p:attrName>
+                                        </p:attrNameLst>
+                                      </p:cBhvr>
+                                      <p:to>
+                                        <p:strVal val="visible"/>
+                                      </p:to>
+                                    </p:set>
+                                  </p:childTnLst>
+                                </p:cTn>
+                              </p:par>
+                              <p:par>
+                                <p:cTn id="21" presetID="1" presetClass="entr" presetSubtype="0" fill="hold" nodeType="withEffect">
+                                  <p:stCondLst>
+                                    <p:cond delay="0"/>
+                                  </p:stCondLst>
+                                  <p:childTnLst>
+                                    <p:set>
+                                      <p:cBhvr>
+                                        <p:cTn id="22" dur="1" fill="hold">
+                                          <p:stCondLst>
+                                            <p:cond delay="0"/>
+                                          </p:stCondLst>
+                                        </p:cTn>
+                                        <p:tgtEl>
+                                          <p:spTgt spid="25"/>
+                                        </p:tgtEl>
+                                        <p:attrNameLst>
+                                          <p:attrName>style.visibility</p:attrName>
+                                        </p:attrNameLst>
+                                      </p:cBhvr>
+                                      <p:to>
+                                        <p:strVal val="visible"/>
+                                      </p:to>
+                                    </p:set>
+                                  </p:childTnLst>
+                                </p:cTn>
+                              </p:par>
+                              <p:par>
+                                <p:cTn id="23" presetID="1" presetClass="entr" presetSubtype="0" fill="hold" grpId="0" nodeType="withEffect">
+                                  <p:stCondLst>
+                                    <p:cond delay="0"/>
+                                  </p:stCondLst>
+                                  <p:childTnLst>
+                                    <p:set>
+                                      <p:cBhvr>
+                                        <p:cTn id="24" dur="1" fill="hold">
+                                          <p:stCondLst>
+                                            <p:cond delay="0"/>
+                                          </p:stCondLst>
+                                        </p:cTn>
+                                        <p:tgtEl>
+                                          <p:spTgt spid="17"/>
+                                        </p:tgtEl>
+                                        <p:attrNameLst>
+                                          <p:attrName>style.visibility</p:attrName>
+                                        </p:attrNameLst>
+                                      </p:cBhvr>
+                                      <p:to>
+                                        <p:strVal val="visible"/>
+                                      </p:to>
+                                    </p:set>
+                                  </p:childTnLst>
+                                </p:cTn>
+                              </p:par>
+                            </p:childTnLst>
+                          </p:cTn>
+                        </p:par>
+                      </p:childTnLst>
+                    </p:cTn>
+                  </p:par>
+                </p:childTnLst>
+              </p:cTn>
+              <p:prevCondLst>
+                <p:cond evt="onPrev" delay="0">
+                  <p:tgtEl>
+                    <p:sldTgt/>
+                  </p:tgtEl>
+                </p:cond>
+              </p:prevCondLst>
+              <p:nextCondLst>
+                <p:cond evt="onNext" delay="0">
+                  <p:tgtEl>
+                    <p:sldTgt/>
+                  </p:tgtEl>
+                </p:cond>
+              </p:nextCondLst>
+            </p:seq>
+          </p:childTnLst>
+        </p:cTn>
+      </p:par>
+    </p:tnLst>
+    <p:bldLst>
+      <p:bldP spid="21" grpId="0"/>
+      <p:bldP spid="17" grpId="0"/>
+    </p:bldLst>
+  </p:timing>
+</p:sld>
+</file>
+
+<file path=ppt/slides/slide6.xml><?xml version="1.0" encoding="utf-8"?>
+<p:sld xmlns:a="http://schemas.openxmlformats.org/drawingml/2006/main" xmlns:r="http://schemas.openxmlformats.org/officeDocument/2006/relationships" xmlns:p="http://schemas.openxmlformats.org/presentationml/2006/main">
+  <p:cSld>
+    <p:spTree>
+      <p:nvGrpSpPr>
+        <p:cNvPr id="1" name=""/>
+        <p:cNvGrpSpPr/>
+        <p:nvPr/>
+      </p:nvGrpSpPr>
+      <p:grpSpPr>
+        <a:xfrm>
+          <a:off x="0" y="0"/>
+          <a:ext cx="0" cy="0"/>
+          <a:chOff x="0" y="0"/>
+          <a:chExt cx="0" cy="0"/>
+        </a:xfrm>
+      </p:grpSpPr>
+      <p:sp>
+        <p:nvSpPr>
+          <p:cNvPr id="2" name="Cím 1"/>
+          <p:cNvSpPr>
+            <a:spLocks noGrp="1"/>
+          </p:cNvSpPr>
+          <p:nvPr>
+            <p:ph type="title"/>
+          </p:nvPr>
+        </p:nvSpPr>
+        <p:spPr/>
+        <p:txBody>
+          <a:bodyPr/>
+          <a:lstStyle/>
+          <a:p>
+            <a:r>
+              <a:rPr lang="en-US" dirty="0" smtClean="0"/>
+              <a:t>BIZTONSÁG</a:t>
+            </a:r>
+            <a:endParaRPr lang="hu-HU" dirty="0"/>
+          </a:p>
+        </p:txBody>
+      </p:sp>
+      <p:pic>
+        <p:nvPicPr>
+          <p:cNvPr id="3" name="Kép 2"/>
+          <p:cNvPicPr>
+            <a:picLocks noChangeAspect="1"/>
+          </p:cNvPicPr>
+          <p:nvPr/>
+        </p:nvPicPr>
+        <p:blipFill>
+          <a:blip r:embed="rId3" cstate="print">
+            <a:extLst>
+              <a:ext uri="{28A0092B-C50C-407E-A947-70E740481C1C}">
+                <a14:useLocalDpi xmlns:a14="http://schemas.microsoft.com/office/drawing/2010/main" val="0"/>
+              </a:ext>
+            </a:extLst>
+          </a:blip>
+          <a:stretch>
+            <a:fillRect/>
+          </a:stretch>
+        </p:blipFill>
+        <p:spPr>
+          <a:xfrm>
+            <a:off x="1187624" y="2492896"/>
+            <a:ext cx="2734504" cy="1367252"/>
+          </a:xfrm>
+          <a:prstGeom prst="rect">
+            <a:avLst/>
+          </a:prstGeom>
+        </p:spPr>
+      </p:pic>
+      <p:sp>
+        <p:nvSpPr>
+          <p:cNvPr id="5" name="Szövegdoboz 4"/>
+          <p:cNvSpPr txBox="1"/>
+          <p:nvPr/>
+        </p:nvSpPr>
+        <p:spPr>
+          <a:xfrm>
+            <a:off x="683568" y="1370320"/>
+            <a:ext cx="5704126" cy="369332"/>
+          </a:xfrm>
+          <a:prstGeom prst="rect">
+            <a:avLst/>
+          </a:prstGeom>
+          <a:noFill/>
+        </p:spPr>
+        <p:txBody>
+          <a:bodyPr wrap="none" rtlCol="0">
+            <a:spAutoFit/>
+          </a:bodyPr>
+          <a:lstStyle/>
+          <a:p>
+            <a:r>
+              <a:rPr lang="en-US" dirty="0" err="1" smtClean="0"/>
+              <a:t>Lépésenkénti</a:t>
+            </a:r>
+            <a:r>
+              <a:rPr lang="en-US" dirty="0" smtClean="0"/>
+              <a:t> </a:t>
+            </a:r>
+            <a:r>
+              <a:rPr lang="en-US" dirty="0" err="1" smtClean="0"/>
+              <a:t>autentikáció</a:t>
+            </a:r>
+            <a:r>
+              <a:rPr lang="en-US" dirty="0" smtClean="0"/>
+              <a:t> (</a:t>
+            </a:r>
+            <a:r>
+              <a:rPr lang="en-US" dirty="0" err="1" smtClean="0"/>
+              <a:t>lekérdezések</a:t>
+            </a:r>
+            <a:r>
+              <a:rPr lang="en-US" dirty="0" smtClean="0"/>
+              <a:t>/</a:t>
+            </a:r>
+            <a:r>
+              <a:rPr lang="en-US" dirty="0" err="1" smtClean="0"/>
+              <a:t>módosítások</a:t>
+            </a:r>
+            <a:r>
+              <a:rPr lang="en-US" dirty="0" smtClean="0"/>
+              <a:t>)</a:t>
+            </a:r>
+            <a:endParaRPr lang="en-US" dirty="0"/>
+          </a:p>
+        </p:txBody>
+      </p:sp>
+      <p:pic>
+        <p:nvPicPr>
+          <p:cNvPr id="6" name="Kép 5"/>
+          <p:cNvPicPr>
+            <a:picLocks noChangeAspect="1"/>
+          </p:cNvPicPr>
+          <p:nvPr/>
+        </p:nvPicPr>
+        <p:blipFill>
+          <a:blip r:embed="rId4">
+            <a:extLst>
+              <a:ext uri="{28A0092B-C50C-407E-A947-70E740481C1C}">
+                <a14:useLocalDpi xmlns:a14="http://schemas.microsoft.com/office/drawing/2010/main" val="0"/>
+              </a:ext>
+            </a:extLst>
+          </a:blip>
+          <a:stretch>
+            <a:fillRect/>
+          </a:stretch>
+        </p:blipFill>
+        <p:spPr>
+          <a:xfrm>
+            <a:off x="5004048" y="2392252"/>
+            <a:ext cx="2265040" cy="1568540"/>
+          </a:xfrm>
+          <a:prstGeom prst="rect">
+            <a:avLst/>
+          </a:prstGeom>
+        </p:spPr>
+      </p:pic>
+    </p:spTree>
+    <p:extLst>
+      <p:ext uri="{BB962C8B-B14F-4D97-AF65-F5344CB8AC3E}">
+        <p14:creationId xmlns:p14="http://schemas.microsoft.com/office/powerpoint/2010/main" val="3359899551"/>
+      </p:ext>
+    </p:extLst>
+  </p:cSld>
+  <p:clrMapOvr>
+    <a:masterClrMapping/>
+  </p:clrMapOvr>
+  <p:timing>
+    <p:tnLst>
+      <p:par>
+        <p:cTn id="1" dur="indefinite" restart="never" nodeType="tmRoot">
+          <p:childTnLst>
+            <p:seq concurrent="1" nextAc="seek">
+              <p:cTn id="2" dur="indefinite" nodeType="mainSeq">
+                <p:childTnLst>
+                  <p:par>
+                    <p:cTn id="3" fill="hold">
+                      <p:stCondLst>
+                        <p:cond delay="indefinite"/>
+                      </p:stCondLst>
+                      <p:childTnLst>
+                        <p:par>
+                          <p:cTn id="4" fill="hold">
+                            <p:stCondLst>
+                              <p:cond delay="0"/>
+                            </p:stCondLst>
+                            <p:childTnLst>
+                              <p:par>
+                                <p:cTn id="5" presetID="1" presetClass="entr" presetSubtype="0" fill="hold" grpId="0" nodeType="clickEffect">
+                                  <p:stCondLst>
+                                    <p:cond delay="0"/>
+                                  </p:stCondLst>
+                                  <p:childTnLst>
+                                    <p:set>
+                                      <p:cBhvr>
+                                        <p:cTn id="6" dur="1" fill="hold">
+                                          <p:stCondLst>
+                                            <p:cond delay="0"/>
+                                          </p:stCondLst>
+                                        </p:cTn>
+                                        <p:tgtEl>
+                                          <p:spTgt spid="5"/>
+                                        </p:tgtEl>
+                                        <p:attrNameLst>
+                                          <p:attrName>style.visibility</p:attrName>
+                                        </p:attrNameLst>
+                                      </p:cBhvr>
+                                      <p:to>
+                                        <p:strVal val="visible"/>
+                                      </p:to>
+                                    </p:set>
+                                  </p:childTnLst>
+                                </p:cTn>
+                              </p:par>
+                            </p:childTnLst>
+                          </p:cTn>
+                        </p:par>
+                      </p:childTnLst>
+                    </p:cTn>
+                  </p:par>
+                  <p:par>
+                    <p:cTn id="7" fill="hold">
+                      <p:stCondLst>
+                        <p:cond delay="indefinite"/>
+                      </p:stCondLst>
+                      <p:childTnLst>
+                        <p:par>
+                          <p:cTn id="8" fill="hold">
+                            <p:stCondLst>
+                              <p:cond delay="0"/>
+                            </p:stCondLst>
+                            <p:childTnLst>
+                              <p:par>
+                                <p:cTn id="9" presetID="1" presetClass="entr" presetSubtype="0" fill="hold" nodeType="clickEffect">
+                                  <p:stCondLst>
+                                    <p:cond delay="0"/>
+                                  </p:stCondLst>
+                                  <p:childTnLst>
+                                    <p:set>
+                                      <p:cBhvr>
+                                        <p:cTn id="10" dur="1" fill="hold">
+                                          <p:stCondLst>
+                                            <p:cond delay="0"/>
+                                          </p:stCondLst>
+                                        </p:cTn>
+                                        <p:tgtEl>
+                                          <p:spTgt spid="3"/>
+                                        </p:tgtEl>
+                                        <p:attrNameLst>
+                                          <p:attrName>style.visibility</p:attrName>
+                                        </p:attrNameLst>
+                                      </p:cBhvr>
+                                      <p:to>
+                                        <p:strVal val="visible"/>
+                                      </p:to>
+                                    </p:set>
+                                  </p:childTnLst>
+                                </p:cTn>
+                              </p:par>
+                            </p:childTnLst>
+                          </p:cTn>
+                        </p:par>
+                      </p:childTnLst>
+                    </p:cTn>
+                  </p:par>
+                  <p:par>
+                    <p:cTn id="11" fill="hold">
+                      <p:stCondLst>
+                        <p:cond delay="indefinite"/>
+                      </p:stCondLst>
+                      <p:childTnLst>
+                        <p:par>
+                          <p:cTn id="12" fill="hold">
+                            <p:stCondLst>
+                              <p:cond delay="0"/>
+                            </p:stCondLst>
+                            <p:childTnLst>
+                              <p:par>
+                                <p:cTn id="13" presetID="1" presetClass="entr" presetSubtype="0" fill="hold" nodeType="clickEffect">
+                                  <p:stCondLst>
+                                    <p:cond delay="0"/>
+                                  </p:stCondLst>
+                                  <p:childTnLst>
+                                    <p:set>
+                                      <p:cBhvr>
+                                        <p:cTn id="14" dur="1" fill="hold">
+                                          <p:stCondLst>
+                                            <p:cond delay="0"/>
+                                          </p:stCondLst>
+                                        </p:cTn>
+                                        <p:tgtEl>
+                                          <p:spTgt spid="6"/>
+                                        </p:tgtEl>
+                                        <p:attrNameLst>
+                                          <p:attrName>style.visibility</p:attrName>
+                                        </p:attrNameLst>
+                                      </p:cBhvr>
+                                      <p:to>
+                                        <p:strVal val="visible"/>
+                                      </p:to>
+                                    </p:set>
+                                  </p:childTnLst>
+                                </p:cTn>
+                              </p:par>
+                            </p:childTnLst>
+                          </p:cTn>
+                        </p:par>
+                      </p:childTnLst>
+                    </p:cTn>
+                  </p:par>
+                </p:childTnLst>
+              </p:cTn>
+              <p:prevCondLst>
+                <p:cond evt="onPrev" delay="0">
+                  <p:tgtEl>
+                    <p:sldTgt/>
+                  </p:tgtEl>
+                </p:cond>
+              </p:prevCondLst>
+              <p:nextCondLst>
+                <p:cond evt="onNext" delay="0">
+                  <p:tgtEl>
+                    <p:sldTgt/>
+                  </p:tgtEl>
+                </p:cond>
+              </p:nextCondLst>
+            </p:seq>
+          </p:childTnLst>
+        </p:cTn>
+      </p:par>
+    </p:tnLst>
+    <p:bldLst>
+      <p:bldP spid="5" grpId="0"/>
+    </p:bldLst>
+  </p:timing>
+</p:sld>
+</file>
+
+<file path=ppt/slides/slide7.xml><?xml version="1.0" encoding="utf-8"?>
+<p:sld xmlns:a="http://schemas.openxmlformats.org/drawingml/2006/main" xmlns:r="http://schemas.openxmlformats.org/officeDocument/2006/relationships" xmlns:p="http://schemas.openxmlformats.org/presentationml/2006/main">
+  <p:cSld>
+    <p:spTree>
+      <p:nvGrpSpPr>
+        <p:cNvPr id="1" name=""/>
+        <p:cNvGrpSpPr/>
+        <p:nvPr/>
+      </p:nvGrpSpPr>
+      <p:grpSpPr>
+        <a:xfrm>
+          <a:off x="0" y="0"/>
+          <a:ext cx="0" cy="0"/>
+          <a:chOff x="0" y="0"/>
+          <a:chExt cx="0" cy="0"/>
+        </a:xfrm>
+      </p:grpSpPr>
+      <p:sp>
+        <p:nvSpPr>
+          <p:cNvPr id="2" name="Cím 1"/>
+          <p:cNvSpPr>
+            <a:spLocks noGrp="1"/>
+          </p:cNvSpPr>
+          <p:nvPr>
+            <p:ph type="title"/>
+          </p:nvPr>
+        </p:nvSpPr>
+        <p:spPr/>
+        <p:txBody>
+          <a:bodyPr/>
+          <a:lstStyle/>
+          <a:p>
+            <a:pPr algn="ctr"/>
+            <a:r>
+              <a:rPr lang="en-US" dirty="0" smtClean="0"/>
+              <a:t>KÖSZÖNJÜK!</a:t>
+            </a:r>
+            <a:endParaRPr lang="en-US" dirty="0"/>
+          </a:p>
+        </p:txBody>
+      </p:sp>
+      <p:pic>
+        <p:nvPicPr>
+          <p:cNvPr id="7" name="Kép 6"/>
+          <p:cNvPicPr>
+            <a:picLocks noChangeAspect="1"/>
+          </p:cNvPicPr>
+          <p:nvPr/>
+        </p:nvPicPr>
+        <p:blipFill>
+          <a:blip r:embed="rId2" cstate="print">
+            <a:extLst>
+              <a:ext uri="{28A0092B-C50C-407E-A947-70E740481C1C}">
+                <a14:useLocalDpi xmlns:a14="http://schemas.microsoft.com/office/drawing/2010/main" val="0"/>
+              </a:ext>
+            </a:extLst>
+          </a:blip>
+          <a:stretch>
+            <a:fillRect/>
+          </a:stretch>
+        </p:blipFill>
+        <p:spPr>
+          <a:xfrm>
+            <a:off x="4583430" y="1318131"/>
+            <a:ext cx="1648986" cy="1648986"/>
+          </a:xfrm>
+          <a:prstGeom prst="rect">
+            <a:avLst/>
+          </a:prstGeom>
+        </p:spPr>
+      </p:pic>
+      <p:pic>
+        <p:nvPicPr>
+          <p:cNvPr id="8" name="Kép 7"/>
+          <p:cNvPicPr>
+            <a:picLocks noChangeAspect="1"/>
+          </p:cNvPicPr>
+          <p:nvPr/>
+        </p:nvPicPr>
+        <p:blipFill>
+          <a:blip r:embed="rId3" cstate="print">
+            <a:extLst>
+              <a:ext uri="{28A0092B-C50C-407E-A947-70E740481C1C}">
+                <a14:useLocalDpi xmlns:a14="http://schemas.microsoft.com/office/drawing/2010/main" val="0"/>
+              </a:ext>
+            </a:extLst>
+          </a:blip>
+          <a:stretch>
+            <a:fillRect/>
+          </a:stretch>
+        </p:blipFill>
+        <p:spPr>
+          <a:xfrm>
+            <a:off x="107504" y="1115895"/>
+            <a:ext cx="3312368" cy="2484276"/>
+          </a:xfrm>
+          <a:prstGeom prst="rect">
+            <a:avLst/>
+          </a:prstGeom>
+        </p:spPr>
+      </p:pic>
+      <p:sp>
+        <p:nvSpPr>
+          <p:cNvPr id="9" name="Pluszjel 8"/>
+          <p:cNvSpPr/>
+          <p:nvPr/>
+        </p:nvSpPr>
+        <p:spPr>
+          <a:xfrm>
+            <a:off x="3419872" y="1595636"/>
+            <a:ext cx="1008112" cy="1080120"/>
+          </a:xfrm>
+          <a:prstGeom prst="mathPlus">
+            <a:avLst/>
+          </a:prstGeom>
+        </p:spPr>
+        <p:style>
+          <a:lnRef idx="2">
+            <a:schemeClr val="accent1">
+              <a:shade val="50000"/>
+            </a:schemeClr>
+          </a:lnRef>
+          <a:fillRef idx="1">
+            <a:schemeClr val="accent1"/>
+          </a:fillRef>
+          <a:effectRef idx="0">
+            <a:schemeClr val="accent1"/>
+          </a:effectRef>
+          <a:fontRef idx="minor">
+            <a:schemeClr val="lt1"/>
+          </a:fontRef>
+        </p:style>
+        <p:txBody>
+          <a:bodyPr rtlCol="0" anchor="ctr"/>
+          <a:lstStyle/>
+          <a:p>
+            <a:pPr algn="ctr"/>
+            <a:endParaRPr lang="en-US"/>
+          </a:p>
+        </p:txBody>
+      </p:sp>
+      <p:sp>
+        <p:nvSpPr>
+          <p:cNvPr id="10" name="Egyenlő 9"/>
+          <p:cNvSpPr/>
+          <p:nvPr/>
+        </p:nvSpPr>
+        <p:spPr>
+          <a:xfrm>
+            <a:off x="6542886" y="1927216"/>
+            <a:ext cx="576064" cy="430817"/>
+          </a:xfrm>
+          <a:prstGeom prst="mathEqual">
+            <a:avLst/>
+          </a:prstGeom>
+        </p:spPr>
+        <p:style>
+          <a:lnRef idx="2">
+            <a:schemeClr val="accent1">
+              <a:shade val="50000"/>
+            </a:schemeClr>
+          </a:lnRef>
+          <a:fillRef idx="1">
+            <a:schemeClr val="accent1"/>
+          </a:fillRef>
+          <a:effectRef idx="0">
+            <a:schemeClr val="accent1"/>
+          </a:effectRef>
+          <a:fontRef idx="minor">
+            <a:schemeClr val="lt1"/>
+          </a:fontRef>
+        </p:style>
+        <p:txBody>
+          <a:bodyPr rtlCol="0" anchor="ctr"/>
+          <a:lstStyle/>
+          <a:p>
+            <a:pPr algn="ctr"/>
+            <a:endParaRPr lang="en-US">
+              <a:solidFill>
+                <a:schemeClr val="tx1"/>
+              </a:solidFill>
+            </a:endParaRPr>
+          </a:p>
+        </p:txBody>
+      </p:sp>
+      <p:pic>
+        <p:nvPicPr>
+          <p:cNvPr id="11" name="Kép 10"/>
+          <p:cNvPicPr>
+            <a:picLocks noChangeAspect="1"/>
+          </p:cNvPicPr>
+          <p:nvPr/>
+        </p:nvPicPr>
+        <p:blipFill>
+          <a:blip r:embed="rId4" cstate="print">
+            <a:extLst>
+              <a:ext uri="{28A0092B-C50C-407E-A947-70E740481C1C}">
+                <a14:useLocalDpi xmlns:a14="http://schemas.microsoft.com/office/drawing/2010/main" val="0"/>
+              </a:ext>
+            </a:extLst>
+          </a:blip>
+          <a:stretch>
+            <a:fillRect/>
+          </a:stretch>
+        </p:blipFill>
+        <p:spPr>
+          <a:xfrm>
+            <a:off x="4283968" y="3155497"/>
+            <a:ext cx="4517836" cy="3024336"/>
+          </a:xfrm>
+          <a:prstGeom prst="rect">
+            <a:avLst/>
+          </a:prstGeom>
+        </p:spPr>
+      </p:pic>
+    </p:spTree>
+    <p:extLst>
+      <p:ext uri="{BB962C8B-B14F-4D97-AF65-F5344CB8AC3E}">
+        <p14:creationId xmlns:p14="http://schemas.microsoft.com/office/powerpoint/2010/main" val="981408761"/>
       </p:ext>
     </p:extLst>
   </p:cSld>

</xml_diff>